<commit_message>
Further Repo Reconstruction DG
</commit_message>
<xml_diff>
--- a/EDA presentation for business users - Week 11.pptx
+++ b/EDA presentation for business users - Week 11.pptx
@@ -10,11 +10,11 @@
     <p:sldId id="258" r:id="rId4"/>
     <p:sldId id="266" r:id="rId5"/>
     <p:sldId id="268" r:id="rId6"/>
-    <p:sldId id="267" r:id="rId7"/>
-    <p:sldId id="269" r:id="rId8"/>
-    <p:sldId id="270" r:id="rId9"/>
-    <p:sldId id="271" r:id="rId10"/>
-    <p:sldId id="265" r:id="rId11"/>
+    <p:sldId id="269" r:id="rId7"/>
+    <p:sldId id="270" r:id="rId8"/>
+    <p:sldId id="271" r:id="rId9"/>
+    <p:sldId id="272" r:id="rId10"/>
+    <p:sldId id="267" r:id="rId11"/>
   </p:sldIdLst>
   <p:sldSz cx="12192000" cy="6858000"/>
   <p:notesSz cx="6858000" cy="9144000"/>
@@ -867,7 +867,7 @@
             <a:fld id="{B61BEF0D-F0BB-DE4B-95CE-6DB70DBA9567}" type="datetimeFigureOut">
               <a:rPr lang="en-US" smtClean="0"/>
               <a:pPr/>
-              <a:t>2/28/24</a:t>
+              <a:t>4/4/24</a:t>
             </a:fld>
             <a:endParaRPr lang="en-US" dirty="0"/>
           </a:p>
@@ -1120,7 +1120,7 @@
             <a:fld id="{B61BEF0D-F0BB-DE4B-95CE-6DB70DBA9567}" type="datetimeFigureOut">
               <a:rPr lang="en-US" smtClean="0"/>
               <a:pPr/>
-              <a:t>2/28/24</a:t>
+              <a:t>4/4/24</a:t>
             </a:fld>
             <a:endParaRPr lang="en-US" dirty="0"/>
           </a:p>
@@ -1436,7 +1436,7 @@
             <a:fld id="{B61BEF0D-F0BB-DE4B-95CE-6DB70DBA9567}" type="datetimeFigureOut">
               <a:rPr lang="en-US" smtClean="0"/>
               <a:pPr/>
-              <a:t>2/28/24</a:t>
+              <a:t>4/4/24</a:t>
             </a:fld>
             <a:endParaRPr lang="en-US" dirty="0"/>
           </a:p>
@@ -1771,7 +1771,7 @@
             <a:fld id="{B61BEF0D-F0BB-DE4B-95CE-6DB70DBA9567}" type="datetimeFigureOut">
               <a:rPr lang="en-US" smtClean="0"/>
               <a:pPr/>
-              <a:t>2/28/24</a:t>
+              <a:t>4/4/24</a:t>
             </a:fld>
             <a:endParaRPr lang="en-US" dirty="0"/>
           </a:p>
@@ -2087,7 +2087,7 @@
             <a:fld id="{B61BEF0D-F0BB-DE4B-95CE-6DB70DBA9567}" type="datetimeFigureOut">
               <a:rPr lang="en-US" smtClean="0"/>
               <a:pPr/>
-              <a:t>2/28/24</a:t>
+              <a:t>4/4/24</a:t>
             </a:fld>
             <a:endParaRPr lang="en-US" dirty="0"/>
           </a:p>
@@ -2482,7 +2482,7 @@
             <a:fld id="{B61BEF0D-F0BB-DE4B-95CE-6DB70DBA9567}" type="datetimeFigureOut">
               <a:rPr lang="en-US" smtClean="0"/>
               <a:pPr/>
-              <a:t>2/28/24</a:t>
+              <a:t>4/4/24</a:t>
             </a:fld>
             <a:endParaRPr lang="en-US" dirty="0"/>
           </a:p>
@@ -2653,7 +2653,7 @@
           <a:p>
             <a:fld id="{55C6B4A9-1611-4792-9094-5F34BCA07E0B}" type="datetimeFigureOut">
               <a:rPr lang="en-US" smtClean="0"/>
-              <a:t>2/28/24</a:t>
+              <a:t>4/4/24</a:t>
             </a:fld>
             <a:endParaRPr lang="en-US" dirty="0"/>
           </a:p>
@@ -2834,7 +2834,7 @@
             <a:fld id="{B61BEF0D-F0BB-DE4B-95CE-6DB70DBA9567}" type="datetimeFigureOut">
               <a:rPr lang="en-US" smtClean="0"/>
               <a:pPr/>
-              <a:t>2/28/24</a:t>
+              <a:t>4/4/24</a:t>
             </a:fld>
             <a:endParaRPr lang="en-US" dirty="0"/>
           </a:p>
@@ -3006,7 +3006,7 @@
             <a:fld id="{B61BEF0D-F0BB-DE4B-95CE-6DB70DBA9567}" type="datetimeFigureOut">
               <a:rPr lang="en-US" smtClean="0"/>
               <a:pPr/>
-              <a:t>2/28/24</a:t>
+              <a:t>4/4/24</a:t>
             </a:fld>
             <a:endParaRPr lang="en-US" dirty="0"/>
           </a:p>
@@ -3255,7 +3255,7 @@
             <a:fld id="{B61BEF0D-F0BB-DE4B-95CE-6DB70DBA9567}" type="datetimeFigureOut">
               <a:rPr lang="en-US" smtClean="0"/>
               <a:pPr/>
-              <a:t>2/28/24</a:t>
+              <a:t>4/4/24</a:t>
             </a:fld>
             <a:endParaRPr lang="en-US" dirty="0"/>
           </a:p>
@@ -3488,7 +3488,7 @@
           <a:p>
             <a:fld id="{EB712588-04B1-427B-82EE-E8DB90309F08}" type="datetimeFigureOut">
               <a:rPr lang="en-US" smtClean="0"/>
-              <a:t>2/28/24</a:t>
+              <a:t>4/4/24</a:t>
             </a:fld>
             <a:endParaRPr lang="en-US" dirty="0"/>
           </a:p>
@@ -3863,7 +3863,7 @@
             <a:fld id="{B61BEF0D-F0BB-DE4B-95CE-6DB70DBA9567}" type="datetimeFigureOut">
               <a:rPr lang="en-US" smtClean="0"/>
               <a:pPr/>
-              <a:t>2/28/24</a:t>
+              <a:t>4/4/24</a:t>
             </a:fld>
             <a:endParaRPr lang="en-US" dirty="0"/>
           </a:p>
@@ -3988,7 +3988,7 @@
             <a:fld id="{B61BEF0D-F0BB-DE4B-95CE-6DB70DBA9567}" type="datetimeFigureOut">
               <a:rPr lang="en-US" smtClean="0"/>
               <a:pPr/>
-              <a:t>2/28/24</a:t>
+              <a:t>4/4/24</a:t>
             </a:fld>
             <a:endParaRPr lang="en-US" dirty="0"/>
           </a:p>
@@ -4085,7 +4085,7 @@
             <a:fld id="{B61BEF0D-F0BB-DE4B-95CE-6DB70DBA9567}" type="datetimeFigureOut">
               <a:rPr lang="en-US" smtClean="0"/>
               <a:pPr/>
-              <a:t>2/28/24</a:t>
+              <a:t>4/4/24</a:t>
             </a:fld>
             <a:endParaRPr lang="en-US" dirty="0"/>
           </a:p>
@@ -4341,7 +4341,7 @@
           <a:p>
             <a:fld id="{42A54C80-263E-416B-A8E0-580EDEADCBDC}" type="datetimeFigureOut">
               <a:rPr lang="en-US" smtClean="0"/>
-              <a:t>2/28/24</a:t>
+              <a:t>4/4/24</a:t>
             </a:fld>
             <a:endParaRPr lang="en-US" dirty="0"/>
           </a:p>
@@ -4648,7 +4648,7 @@
             <a:fld id="{B61BEF0D-F0BB-DE4B-95CE-6DB70DBA9567}" type="datetimeFigureOut">
               <a:rPr lang="en-US" smtClean="0"/>
               <a:pPr/>
-              <a:t>2/28/24</a:t>
+              <a:t>4/4/24</a:t>
             </a:fld>
             <a:endParaRPr lang="en-US" dirty="0"/>
           </a:p>
@@ -5351,7 +5351,7 @@
             <a:fld id="{B61BEF0D-F0BB-DE4B-95CE-6DB70DBA9567}" type="datetimeFigureOut">
               <a:rPr lang="en-US" smtClean="0"/>
               <a:pPr/>
-              <a:t>2/28/24</a:t>
+              <a:t>4/4/24</a:t>
             </a:fld>
             <a:endParaRPr lang="en-US" dirty="0"/>
           </a:p>
@@ -5967,7 +5967,7 @@
           <p:cNvPr id="2" name="Title 1">
             <a:extLst>
               <a:ext uri="{FF2B5EF4-FFF2-40B4-BE49-F238E27FC236}">
-                <a16:creationId xmlns:a16="http://schemas.microsoft.com/office/drawing/2014/main" id="{E52A3539-2FE1-707C-EC8B-30C055B64182}"/>
+                <a16:creationId xmlns:a16="http://schemas.microsoft.com/office/drawing/2014/main" id="{10A481D1-32AD-069B-2833-E1E88FF0E102}"/>
               </a:ext>
             </a:extLst>
           </p:cNvPr>
@@ -5978,19 +5978,14 @@
             <p:ph type="title"/>
           </p:nvPr>
         </p:nvSpPr>
-        <p:spPr>
-          <a:xfrm>
-            <a:off x="677333" y="308114"/>
-            <a:ext cx="8596668" cy="1320800"/>
-          </a:xfrm>
-        </p:spPr>
+        <p:spPr/>
         <p:txBody>
           <a:bodyPr/>
           <a:lstStyle/>
           <a:p>
             <a:r>
               <a:rPr lang="en-GB" dirty="0"/>
-              <a:t>Model Conclusions</a:t>
+              <a:t>Model Selection</a:t>
             </a:r>
           </a:p>
         </p:txBody>
@@ -6000,7 +5995,7 @@
           <p:cNvPr id="3" name="Content Placeholder 2">
             <a:extLst>
               <a:ext uri="{FF2B5EF4-FFF2-40B4-BE49-F238E27FC236}">
-                <a16:creationId xmlns:a16="http://schemas.microsoft.com/office/drawing/2014/main" id="{69429250-9A38-5625-544E-053498A60C7D}"/>
+                <a16:creationId xmlns:a16="http://schemas.microsoft.com/office/drawing/2014/main" id="{2788CAD1-6032-8895-675E-027EB042B14D}"/>
               </a:ext>
             </a:extLst>
           </p:cNvPr>
@@ -6013,46 +6008,51 @@
         </p:nvSpPr>
         <p:spPr>
           <a:xfrm>
-            <a:off x="677333" y="1162878"/>
-            <a:ext cx="10116563" cy="5569226"/>
+            <a:off x="677334" y="1838738"/>
+            <a:ext cx="9659362" cy="4480919"/>
           </a:xfrm>
         </p:spPr>
         <p:txBody>
           <a:bodyPr>
-            <a:noAutofit/>
+            <a:normAutofit fontScale="70000" lnSpcReduction="20000"/>
           </a:bodyPr>
           <a:lstStyle/>
           <a:p>
-            <a:pPr marL="0" indent="0" algn="l">
-              <a:buNone/>
+            <a:pPr>
+              <a:buFont typeface="Arial" panose="020B0604020202020204" pitchFamily="34" charset="0"/>
+              <a:buChar char="•"/>
             </a:pPr>
             <a:r>
-              <a:rPr lang="en-GB" sz="900" b="1" i="0" u="none" strike="noStrike" dirty="0">
+              <a:rPr lang="en-GB" sz="2600" b="1" i="0" u="none" strike="noStrike" dirty="0">
                 <a:solidFill>
                   <a:schemeClr val="tx1"/>
                 </a:solidFill>
                 <a:effectLst/>
                 <a:latin typeface="+mj-lt"/>
               </a:rPr>
-              <a:t>Performance Overview:</a:t>
-            </a:r>
-          </a:p>
-          <a:p>
-            <a:pPr algn="l">
-              <a:buFont typeface="Arial" panose="020B0604020202020204" pitchFamily="34" charset="0"/>
-              <a:buChar char="•"/>
-            </a:pPr>
-            <a:r>
-              <a:rPr lang="en-GB" sz="900" b="1" i="0" u="none" strike="noStrike" dirty="0">
+              <a:t>3 Models will be chosen for </a:t>
+            </a:r>
+            <a:r>
+              <a:rPr lang="en-GB" sz="2600" b="1" i="0" u="none" strike="noStrike" dirty="0" err="1">
                 <a:solidFill>
                   <a:schemeClr val="tx1"/>
                 </a:solidFill>
                 <a:effectLst/>
                 <a:latin typeface="+mj-lt"/>
               </a:rPr>
-              <a:t>Accuracy:</a:t>
-            </a:r>
-            <a:endParaRPr lang="en-GB" sz="900" b="0" i="0" u="none" strike="noStrike" dirty="0">
+              <a:t>Persistency_Flag</a:t>
+            </a:r>
+            <a:r>
+              <a:rPr lang="en-GB" sz="2600" b="1" i="0" u="none" strike="noStrike" dirty="0">
+                <a:solidFill>
+                  <a:schemeClr val="tx1"/>
+                </a:solidFill>
+                <a:effectLst/>
+                <a:latin typeface="+mj-lt"/>
+              </a:rPr>
+              <a:t> prediction :</a:t>
+            </a:r>
+            <a:endParaRPr lang="en-GB" sz="2600" b="0" i="0" u="none" strike="noStrike" dirty="0">
               <a:solidFill>
                 <a:schemeClr val="tx1"/>
               </a:solidFill>
@@ -6066,46 +6066,16 @@
               <a:buChar char="•"/>
             </a:pPr>
             <a:r>
-              <a:rPr lang="en-GB" sz="900" b="0" i="0" u="none" strike="noStrike" dirty="0">
+              <a:rPr lang="en-GB" sz="2600" b="1" i="0" u="none" strike="noStrike" dirty="0">
                 <a:solidFill>
                   <a:schemeClr val="tx1"/>
                 </a:solidFill>
                 <a:effectLst/>
                 <a:latin typeface="+mj-lt"/>
               </a:rPr>
-              <a:t>Highest Accuracy: </a:t>
-            </a:r>
-            <a:r>
-              <a:rPr lang="en-GB" sz="900" b="1" i="0" u="none" strike="noStrike" dirty="0" err="1">
-                <a:solidFill>
-                  <a:schemeClr val="tx1"/>
-                </a:solidFill>
-                <a:effectLst/>
-                <a:latin typeface="+mj-lt"/>
-              </a:rPr>
-              <a:t>XGBoost</a:t>
-            </a:r>
-            <a:r>
-              <a:rPr lang="en-GB" sz="900" b="0" i="0" u="none" strike="noStrike" dirty="0">
-                <a:solidFill>
-                  <a:schemeClr val="tx1"/>
-                </a:solidFill>
-                <a:effectLst/>
-                <a:latin typeface="+mj-lt"/>
-              </a:rPr>
-              <a:t> at </a:t>
-            </a:r>
-            <a:r>
-              <a:rPr lang="en-GB" sz="900" b="1" i="0" u="none" strike="noStrike" dirty="0">
-                <a:solidFill>
-                  <a:schemeClr val="tx1"/>
-                </a:solidFill>
-                <a:effectLst/>
-                <a:latin typeface="+mj-lt"/>
-              </a:rPr>
-              <a:t>84.71%</a:t>
-            </a:r>
-            <a:endParaRPr lang="en-GB" sz="900" b="0" i="0" u="none" strike="noStrike" dirty="0">
+              <a:t>Logistic Regression (Baseline Measurement):</a:t>
+            </a:r>
+            <a:endParaRPr lang="en-GB" sz="2600" b="0" i="0" u="none" strike="noStrike" dirty="0">
               <a:solidFill>
                 <a:schemeClr val="tx1"/>
               </a:solidFill>
@@ -6114,37 +6084,69 @@
             </a:endParaRPr>
           </a:p>
           <a:p>
+            <a:pPr marL="1143000" lvl="2" indent="-228600" algn="l">
+              <a:buFont typeface="Arial" panose="020B0604020202020204" pitchFamily="34" charset="0"/>
+              <a:buChar char="•"/>
+            </a:pPr>
+            <a:r>
+              <a:rPr lang="en-GB" sz="2200" b="0" i="0" u="none" strike="noStrike" dirty="0">
+                <a:solidFill>
+                  <a:schemeClr val="tx1"/>
+                </a:solidFill>
+                <a:effectLst/>
+                <a:latin typeface="+mj-lt"/>
+              </a:rPr>
+              <a:t>Chosen for its simplicity and efficiency in binary classification tasks.</a:t>
+            </a:r>
+          </a:p>
+          <a:p>
+            <a:pPr marL="1143000" lvl="2" indent="-228600" algn="l">
+              <a:buFont typeface="Arial" panose="020B0604020202020204" pitchFamily="34" charset="0"/>
+              <a:buChar char="•"/>
+            </a:pPr>
+            <a:r>
+              <a:rPr lang="en-GB" sz="2200" b="0" i="0" u="none" strike="noStrike" dirty="0">
+                <a:solidFill>
+                  <a:schemeClr val="tx1"/>
+                </a:solidFill>
+                <a:effectLst/>
+                <a:latin typeface="+mj-lt"/>
+              </a:rPr>
+              <a:t>Provides clear probabilistic interpretation of model outputs.</a:t>
+            </a:r>
+          </a:p>
+          <a:p>
+            <a:pPr marL="1143000" lvl="2" indent="-228600" algn="l">
+              <a:buFont typeface="Arial" panose="020B0604020202020204" pitchFamily="34" charset="0"/>
+              <a:buChar char="•"/>
+            </a:pPr>
+            <a:r>
+              <a:rPr lang="en-GB" sz="2200" b="0" i="0" u="none" strike="noStrike" dirty="0">
+                <a:solidFill>
+                  <a:schemeClr val="tx1"/>
+                </a:solidFill>
+                <a:effectLst/>
+                <a:latin typeface="+mj-lt"/>
+              </a:rPr>
+              <a:t>Useful for understanding the influence of individual features on the outcome.</a:t>
+            </a:r>
+          </a:p>
+          <a:p>
             <a:pPr marL="742950" lvl="1" indent="-285750" algn="l">
               <a:buFont typeface="Arial" panose="020B0604020202020204" pitchFamily="34" charset="0"/>
               <a:buChar char="•"/>
             </a:pPr>
             <a:r>
-              <a:rPr lang="en-GB" sz="900" b="0" i="0" u="none" strike="noStrike" dirty="0">
+              <a:rPr lang="en-GB" sz="2600" b="1" i="0" u="none" strike="noStrike" dirty="0">
                 <a:solidFill>
                   <a:schemeClr val="tx1"/>
                 </a:solidFill>
                 <a:effectLst/>
                 <a:latin typeface="+mj-lt"/>
               </a:rPr>
-              <a:t>Ensures overall correctness across the dataset.</a:t>
-            </a:r>
-          </a:p>
-          <a:p>
-            <a:pPr algn="l">
-              <a:buFont typeface="Arial" panose="020B0604020202020204" pitchFamily="34" charset="0"/>
-              <a:buChar char="•"/>
-            </a:pPr>
-            <a:r>
-              <a:rPr lang="en-GB" sz="900" b="1" i="0" u="none" strike="noStrike" dirty="0">
-                <a:solidFill>
-                  <a:schemeClr val="tx1"/>
-                </a:solidFill>
-                <a:effectLst/>
-                <a:latin typeface="+mj-lt"/>
-              </a:rPr>
-              <a:t>Precision:</a:t>
-            </a:r>
-            <a:endParaRPr lang="en-GB" sz="900" b="0" i="0" u="none" strike="noStrike" dirty="0">
+              <a:t>Random Forest Classification:</a:t>
+            </a:r>
+            <a:endParaRPr lang="en-GB" sz="2600" b="0" i="0" u="none" strike="noStrike" dirty="0">
               <a:solidFill>
                 <a:schemeClr val="tx1"/>
               </a:solidFill>
@@ -6153,22 +6155,60 @@
             </a:endParaRPr>
           </a:p>
           <a:p>
+            <a:pPr marL="1143000" lvl="2" indent="-228600" algn="l">
+              <a:buFont typeface="Arial" panose="020B0604020202020204" pitchFamily="34" charset="0"/>
+              <a:buChar char="•"/>
+            </a:pPr>
+            <a:r>
+              <a:rPr lang="en-GB" sz="2200" b="0" i="0" u="none" strike="noStrike" dirty="0">
+                <a:solidFill>
+                  <a:schemeClr val="tx1"/>
+                </a:solidFill>
+                <a:effectLst/>
+                <a:latin typeface="+mj-lt"/>
+              </a:rPr>
+              <a:t>Selected for its robustness and ability to handle non-linear data.</a:t>
+            </a:r>
+          </a:p>
+          <a:p>
+            <a:pPr marL="1143000" lvl="2" indent="-228600" algn="l">
+              <a:buFont typeface="Arial" panose="020B0604020202020204" pitchFamily="34" charset="0"/>
+              <a:buChar char="•"/>
+            </a:pPr>
+            <a:r>
+              <a:rPr lang="en-GB" sz="2200" b="0" i="0" u="none" strike="noStrike" dirty="0">
+                <a:solidFill>
+                  <a:schemeClr val="tx1"/>
+                </a:solidFill>
+                <a:effectLst/>
+                <a:latin typeface="+mj-lt"/>
+              </a:rPr>
+              <a:t>Excels in handling large datasets with higher dimensionality.</a:t>
+            </a:r>
+          </a:p>
+          <a:p>
+            <a:pPr marL="1143000" lvl="2" indent="-228600" algn="l">
+              <a:buFont typeface="Arial" panose="020B0604020202020204" pitchFamily="34" charset="0"/>
+              <a:buChar char="•"/>
+            </a:pPr>
+            <a:r>
+              <a:rPr lang="en-GB" sz="2200" b="0" i="0" u="none" strike="noStrike" dirty="0">
+                <a:solidFill>
+                  <a:schemeClr val="tx1"/>
+                </a:solidFill>
+                <a:effectLst/>
+                <a:latin typeface="+mj-lt"/>
+              </a:rPr>
+              <a:t>Offers insights into feature importance, enhancing model interpretability.</a:t>
+            </a:r>
+          </a:p>
+          <a:p>
             <a:pPr marL="742950" lvl="1" indent="-285750" algn="l">
               <a:buFont typeface="Arial" panose="020B0604020202020204" pitchFamily="34" charset="0"/>
               <a:buChar char="•"/>
             </a:pPr>
             <a:r>
-              <a:rPr lang="en-GB" sz="900" b="0" i="0" u="none" strike="noStrike" dirty="0">
-                <a:solidFill>
-                  <a:schemeClr val="tx1"/>
-                </a:solidFill>
-                <a:effectLst/>
-                <a:latin typeface="+mj-lt"/>
-              </a:rPr>
-              <a:t>Highest Precision: </a:t>
-            </a:r>
-            <a:r>
-              <a:rPr lang="en-GB" sz="900" b="1" i="0" u="none" strike="noStrike" dirty="0" err="1">
+              <a:rPr lang="en-GB" sz="2600" b="1" i="0" u="none" strike="noStrike" dirty="0" err="1">
                 <a:solidFill>
                   <a:schemeClr val="tx1"/>
                 </a:solidFill>
@@ -6178,26 +6218,16 @@
               <a:t>XGBoost</a:t>
             </a:r>
             <a:r>
-              <a:rPr lang="en-GB" sz="900" b="0" i="0" u="none" strike="noStrike" dirty="0">
+              <a:rPr lang="en-GB" sz="2600" b="1" i="0" u="none" strike="noStrike" dirty="0">
                 <a:solidFill>
                   <a:schemeClr val="tx1"/>
                 </a:solidFill>
                 <a:effectLst/>
                 <a:latin typeface="+mj-lt"/>
               </a:rPr>
-              <a:t> at </a:t>
-            </a:r>
-            <a:r>
-              <a:rPr lang="en-GB" sz="900" b="1" i="0" u="none" strike="noStrike" dirty="0">
-                <a:solidFill>
-                  <a:schemeClr val="tx1"/>
-                </a:solidFill>
-                <a:effectLst/>
-                <a:latin typeface="+mj-lt"/>
-              </a:rPr>
-              <a:t>84.93%</a:t>
-            </a:r>
-            <a:endParaRPr lang="en-GB" sz="900" b="0" i="0" u="none" strike="noStrike" dirty="0">
+              <a:t>:</a:t>
+            </a:r>
+            <a:endParaRPr lang="en-GB" sz="2600" b="0" i="0" u="none" strike="noStrike" dirty="0">
               <a:solidFill>
                 <a:schemeClr val="tx1"/>
               </a:solidFill>
@@ -6206,512 +6236,62 @@
             </a:endParaRPr>
           </a:p>
           <a:p>
-            <a:pPr marL="742950" lvl="1" indent="-285750" algn="l">
+            <a:pPr marL="1143000" lvl="2" indent="-228600" algn="l">
               <a:buFont typeface="Arial" panose="020B0604020202020204" pitchFamily="34" charset="0"/>
               <a:buChar char="•"/>
             </a:pPr>
             <a:r>
-              <a:rPr lang="en-GB" sz="900" b="0" i="0" u="none" strike="noStrike" dirty="0">
+              <a:rPr lang="en-GB" sz="2200" b="0" i="0" u="none" strike="noStrike" dirty="0">
                 <a:solidFill>
                   <a:schemeClr val="tx1"/>
                 </a:solidFill>
                 <a:effectLst/>
                 <a:latin typeface="+mj-lt"/>
               </a:rPr>
-              <a:t>Reflects the model's strength in reducing false positives.</a:t>
-            </a:r>
-          </a:p>
-          <a:p>
-            <a:pPr algn="l">
+              <a:t>Opted for its high performance and speed in training.</a:t>
+            </a:r>
+          </a:p>
+          <a:p>
+            <a:pPr marL="1143000" lvl="2" indent="-228600" algn="l">
               <a:buFont typeface="Arial" panose="020B0604020202020204" pitchFamily="34" charset="0"/>
               <a:buChar char="•"/>
             </a:pPr>
             <a:r>
-              <a:rPr lang="en-GB" sz="900" b="1" i="0" u="none" strike="noStrike" dirty="0">
+              <a:rPr lang="en-GB" sz="2200" b="0" i="0" u="none" strike="noStrike" dirty="0">
                 <a:solidFill>
                   <a:schemeClr val="tx1"/>
                 </a:solidFill>
                 <a:effectLst/>
                 <a:latin typeface="+mj-lt"/>
               </a:rPr>
-              <a:t>Recall:</a:t>
-            </a:r>
-            <a:endParaRPr lang="en-GB" sz="900" b="0" i="0" u="none" strike="noStrike" dirty="0">
-              <a:solidFill>
-                <a:schemeClr val="tx1"/>
-              </a:solidFill>
-              <a:effectLst/>
-              <a:latin typeface="+mj-lt"/>
-            </a:endParaRPr>
-          </a:p>
-          <a:p>
-            <a:pPr marL="742950" lvl="1" indent="-285750" algn="l">
+              <a:t>Known for delivering state-of-the-art results on many machine learning challenges.</a:t>
+            </a:r>
+          </a:p>
+          <a:p>
+            <a:pPr marL="1143000" lvl="2" indent="-228600" algn="l">
               <a:buFont typeface="Arial" panose="020B0604020202020204" pitchFamily="34" charset="0"/>
               <a:buChar char="•"/>
             </a:pPr>
             <a:r>
-              <a:rPr lang="en-GB" sz="900" b="0" i="0" u="none" strike="noStrike" dirty="0">
+              <a:rPr lang="en-GB" sz="2200" b="0" i="0" u="none" strike="noStrike" dirty="0">
                 <a:solidFill>
                   <a:schemeClr val="tx1"/>
                 </a:solidFill>
                 <a:effectLst/>
                 <a:latin typeface="+mj-lt"/>
               </a:rPr>
-              <a:t>Highest Recall: </a:t>
-            </a:r>
-            <a:r>
-              <a:rPr lang="en-GB" sz="900" b="1" i="0" u="none" strike="noStrike" dirty="0">
-                <a:solidFill>
-                  <a:schemeClr val="tx1"/>
-                </a:solidFill>
-                <a:effectLst/>
-                <a:latin typeface="+mj-lt"/>
-              </a:rPr>
-              <a:t>Logistic Regression</a:t>
-            </a:r>
-            <a:r>
-              <a:rPr lang="en-GB" sz="900" b="0" i="0" u="none" strike="noStrike" dirty="0">
-                <a:solidFill>
-                  <a:schemeClr val="tx1"/>
-                </a:solidFill>
-                <a:effectLst/>
-                <a:latin typeface="+mj-lt"/>
-              </a:rPr>
-              <a:t> at </a:t>
-            </a:r>
-            <a:r>
-              <a:rPr lang="en-GB" sz="900" b="1" i="0" u="none" strike="noStrike" dirty="0">
-                <a:solidFill>
-                  <a:schemeClr val="tx1"/>
-                </a:solidFill>
-                <a:effectLst/>
-                <a:latin typeface="+mj-lt"/>
-              </a:rPr>
-              <a:t>73.71%</a:t>
-            </a:r>
-            <a:endParaRPr lang="en-GB" sz="900" b="0" i="0" u="none" strike="noStrike" dirty="0">
-              <a:solidFill>
-                <a:schemeClr val="tx1"/>
-              </a:solidFill>
-              <a:effectLst/>
-              <a:latin typeface="+mj-lt"/>
-            </a:endParaRPr>
-          </a:p>
-          <a:p>
-            <a:pPr marL="742950" lvl="1" indent="-285750" algn="l">
-              <a:buFont typeface="Arial" panose="020B0604020202020204" pitchFamily="34" charset="0"/>
-              <a:buChar char="•"/>
-            </a:pPr>
-            <a:r>
-              <a:rPr lang="en-GB" sz="900" b="0" i="0" u="none" strike="noStrike" dirty="0">
-                <a:solidFill>
-                  <a:schemeClr val="tx1"/>
-                </a:solidFill>
-                <a:effectLst/>
-                <a:latin typeface="+mj-lt"/>
-              </a:rPr>
-              <a:t>Important for cases where missing a positive is costly.</a:t>
-            </a:r>
-          </a:p>
-          <a:p>
-            <a:pPr algn="l">
-              <a:buFont typeface="Arial" panose="020B0604020202020204" pitchFamily="34" charset="0"/>
-              <a:buChar char="•"/>
-            </a:pPr>
-            <a:r>
-              <a:rPr lang="en-GB" sz="900" b="1" i="0" u="none" strike="noStrike" dirty="0">
-                <a:solidFill>
-                  <a:schemeClr val="tx1"/>
-                </a:solidFill>
-                <a:effectLst/>
-                <a:latin typeface="+mj-lt"/>
-              </a:rPr>
-              <a:t>F1 Score:</a:t>
-            </a:r>
-            <a:endParaRPr lang="en-GB" sz="900" b="0" i="0" u="none" strike="noStrike" dirty="0">
-              <a:solidFill>
-                <a:schemeClr val="tx1"/>
-              </a:solidFill>
-              <a:effectLst/>
-              <a:latin typeface="+mj-lt"/>
-            </a:endParaRPr>
-          </a:p>
-          <a:p>
-            <a:pPr marL="742950" lvl="1" indent="-285750" algn="l">
-              <a:buFont typeface="Arial" panose="020B0604020202020204" pitchFamily="34" charset="0"/>
-              <a:buChar char="•"/>
-            </a:pPr>
-            <a:r>
-              <a:rPr lang="en-GB" sz="900" b="0" i="0" u="none" strike="noStrike" dirty="0">
-                <a:solidFill>
-                  <a:schemeClr val="tx1"/>
-                </a:solidFill>
-                <a:effectLst/>
-                <a:latin typeface="+mj-lt"/>
-              </a:rPr>
-              <a:t>Highest F1 Score: </a:t>
-            </a:r>
-            <a:r>
-              <a:rPr lang="en-GB" sz="900" b="1" i="0" u="none" strike="noStrike" dirty="0" err="1">
-                <a:solidFill>
-                  <a:schemeClr val="tx1"/>
-                </a:solidFill>
-                <a:effectLst/>
-                <a:latin typeface="+mj-lt"/>
-              </a:rPr>
-              <a:t>XGBoost</a:t>
-            </a:r>
-            <a:r>
-              <a:rPr lang="en-GB" sz="900" b="0" i="0" u="none" strike="noStrike" dirty="0">
-                <a:solidFill>
-                  <a:schemeClr val="tx1"/>
-                </a:solidFill>
-                <a:effectLst/>
-                <a:latin typeface="+mj-lt"/>
-              </a:rPr>
-              <a:t> at </a:t>
-            </a:r>
-            <a:r>
-              <a:rPr lang="en-GB" sz="900" b="1" i="0" u="none" strike="noStrike" dirty="0">
-                <a:solidFill>
-                  <a:schemeClr val="tx1"/>
-                </a:solidFill>
-                <a:effectLst/>
-                <a:latin typeface="+mj-lt"/>
-              </a:rPr>
-              <a:t>79.15%</a:t>
-            </a:r>
-            <a:endParaRPr lang="en-GB" sz="900" b="0" i="0" u="none" strike="noStrike" dirty="0">
-              <a:solidFill>
-                <a:schemeClr val="tx1"/>
-              </a:solidFill>
-              <a:effectLst/>
-              <a:latin typeface="+mj-lt"/>
-            </a:endParaRPr>
-          </a:p>
-          <a:p>
-            <a:pPr marL="742950" lvl="1" indent="-285750" algn="l">
-              <a:buFont typeface="Arial" panose="020B0604020202020204" pitchFamily="34" charset="0"/>
-              <a:buChar char="•"/>
-            </a:pPr>
-            <a:r>
-              <a:rPr lang="en-GB" sz="900" b="0" i="0" u="none" strike="noStrike" dirty="0">
-                <a:solidFill>
-                  <a:schemeClr val="tx1"/>
-                </a:solidFill>
-                <a:effectLst/>
-                <a:latin typeface="+mj-lt"/>
-              </a:rPr>
-              <a:t>Balances precision and recall, valuable for uneven class distribution.</a:t>
-            </a:r>
-          </a:p>
-          <a:p>
-            <a:pPr algn="l">
-              <a:buFont typeface="Arial" panose="020B0604020202020204" pitchFamily="34" charset="0"/>
-              <a:buChar char="•"/>
-            </a:pPr>
-            <a:r>
-              <a:rPr lang="en-GB" sz="900" b="1" i="0" u="none" strike="noStrike" dirty="0">
-                <a:solidFill>
-                  <a:schemeClr val="tx1"/>
-                </a:solidFill>
-                <a:effectLst/>
-                <a:latin typeface="+mj-lt"/>
-              </a:rPr>
-              <a:t>ROC-AUC Score:</a:t>
-            </a:r>
-            <a:endParaRPr lang="en-GB" sz="900" b="0" i="0" u="none" strike="noStrike" dirty="0">
-              <a:solidFill>
-                <a:schemeClr val="tx1"/>
-              </a:solidFill>
-              <a:effectLst/>
-              <a:latin typeface="+mj-lt"/>
-            </a:endParaRPr>
-          </a:p>
-          <a:p>
-            <a:pPr marL="742950" lvl="1" indent="-285750" algn="l">
-              <a:buFont typeface="Arial" panose="020B0604020202020204" pitchFamily="34" charset="0"/>
-              <a:buChar char="•"/>
-            </a:pPr>
-            <a:r>
-              <a:rPr lang="en-GB" sz="900" b="0" i="0" u="none" strike="noStrike" dirty="0">
-                <a:solidFill>
-                  <a:schemeClr val="tx1"/>
-                </a:solidFill>
-                <a:effectLst/>
-                <a:latin typeface="+mj-lt"/>
-              </a:rPr>
-              <a:t>Highest ROC-AUC: </a:t>
-            </a:r>
-            <a:r>
-              <a:rPr lang="en-GB" sz="900" b="1" i="0" u="none" strike="noStrike" dirty="0" err="1">
-                <a:solidFill>
-                  <a:schemeClr val="tx1"/>
-                </a:solidFill>
-                <a:effectLst/>
-                <a:latin typeface="+mj-lt"/>
-              </a:rPr>
-              <a:t>XGBoost</a:t>
-            </a:r>
-            <a:r>
-              <a:rPr lang="en-GB" sz="900" b="0" i="0" u="none" strike="noStrike" dirty="0">
-                <a:solidFill>
-                  <a:schemeClr val="tx1"/>
-                </a:solidFill>
-                <a:effectLst/>
-                <a:latin typeface="+mj-lt"/>
-              </a:rPr>
-              <a:t> at </a:t>
-            </a:r>
-            <a:r>
-              <a:rPr lang="en-GB" sz="900" b="1" i="0" u="none" strike="noStrike" dirty="0">
-                <a:solidFill>
-                  <a:schemeClr val="tx1"/>
-                </a:solidFill>
-                <a:effectLst/>
-                <a:latin typeface="+mj-lt"/>
-              </a:rPr>
-              <a:t>90.66%</a:t>
-            </a:r>
-            <a:endParaRPr lang="en-GB" sz="900" b="0" i="0" u="none" strike="noStrike" dirty="0">
-              <a:solidFill>
-                <a:schemeClr val="tx1"/>
-              </a:solidFill>
-              <a:effectLst/>
-              <a:latin typeface="+mj-lt"/>
-            </a:endParaRPr>
-          </a:p>
-          <a:p>
-            <a:pPr marL="742950" lvl="1" indent="-285750" algn="l">
-              <a:buFont typeface="Arial" panose="020B0604020202020204" pitchFamily="34" charset="0"/>
-              <a:buChar char="•"/>
-            </a:pPr>
-            <a:r>
-              <a:rPr lang="en-GB" sz="900" b="0" i="0" u="none" strike="noStrike" dirty="0">
-                <a:solidFill>
-                  <a:schemeClr val="tx1"/>
-                </a:solidFill>
-                <a:effectLst/>
-                <a:latin typeface="+mj-lt"/>
-              </a:rPr>
-              <a:t>Indicates the model's ability to discriminate between classes.</a:t>
-            </a:r>
-          </a:p>
-          <a:p>
-            <a:pPr marL="742950" lvl="1" indent="-285750" algn="l">
-              <a:buFont typeface="Arial" panose="020B0604020202020204" pitchFamily="34" charset="0"/>
-              <a:buChar char="•"/>
-            </a:pPr>
-            <a:endParaRPr lang="en-GB" sz="900" dirty="0">
-              <a:solidFill>
-                <a:schemeClr val="tx1"/>
-              </a:solidFill>
-              <a:latin typeface="+mj-lt"/>
-            </a:endParaRPr>
-          </a:p>
-          <a:p>
-            <a:pPr algn="l"/>
-            <a:r>
-              <a:rPr lang="en-GB" sz="900" b="1" i="0" u="none" strike="noStrike" dirty="0">
-                <a:solidFill>
-                  <a:schemeClr val="tx1"/>
-                </a:solidFill>
-                <a:effectLst/>
-                <a:latin typeface="+mj-lt"/>
-              </a:rPr>
-              <a:t>Best Model Selection:</a:t>
-            </a:r>
-          </a:p>
-          <a:p>
-            <a:pPr lvl="1">
-              <a:buFont typeface="Arial" panose="020B0604020202020204" pitchFamily="34" charset="0"/>
-              <a:buChar char="•"/>
-            </a:pPr>
-            <a:r>
-              <a:rPr lang="en-GB" sz="900" b="1" i="0" u="none" strike="noStrike" dirty="0">
-                <a:solidFill>
-                  <a:schemeClr val="tx1"/>
-                </a:solidFill>
-                <a:effectLst/>
-                <a:latin typeface="+mj-lt"/>
-              </a:rPr>
-              <a:t>According to Accuracy, Precision, F1 Score, and ROC-AUC Score:</a:t>
-            </a:r>
-            <a:r>
-              <a:rPr lang="en-GB" sz="900" b="0" i="0" u="none" strike="noStrike" dirty="0">
-                <a:solidFill>
-                  <a:schemeClr val="tx1"/>
-                </a:solidFill>
-                <a:effectLst/>
-                <a:latin typeface="+mj-lt"/>
-              </a:rPr>
-              <a:t> </a:t>
-            </a:r>
-            <a:r>
-              <a:rPr lang="en-GB" sz="900" b="0" i="0" u="none" strike="noStrike" dirty="0" err="1">
-                <a:solidFill>
-                  <a:schemeClr val="tx1"/>
-                </a:solidFill>
-                <a:effectLst/>
-                <a:latin typeface="+mj-lt"/>
-              </a:rPr>
-              <a:t>XGBoost</a:t>
-            </a:r>
-            <a:r>
-              <a:rPr lang="en-GB" sz="900" b="0" i="0" u="none" strike="noStrike" dirty="0">
-                <a:solidFill>
-                  <a:schemeClr val="tx1"/>
-                </a:solidFill>
-                <a:effectLst/>
-                <a:latin typeface="+mj-lt"/>
-              </a:rPr>
-              <a:t> stands out as the </a:t>
-            </a:r>
-            <a:r>
-              <a:rPr lang="en-GB" sz="900" b="1" i="0" u="none" strike="noStrike" dirty="0">
-                <a:solidFill>
-                  <a:schemeClr val="tx1"/>
-                </a:solidFill>
-                <a:effectLst/>
-                <a:latin typeface="+mj-lt"/>
-              </a:rPr>
-              <a:t>best model</a:t>
-            </a:r>
-            <a:r>
-              <a:rPr lang="en-GB" sz="900" b="0" i="0" u="none" strike="noStrike" dirty="0">
-                <a:solidFill>
-                  <a:schemeClr val="tx1"/>
-                </a:solidFill>
-                <a:effectLst/>
-                <a:latin typeface="+mj-lt"/>
-              </a:rPr>
-              <a:t>.</a:t>
-            </a:r>
-          </a:p>
-          <a:p>
-            <a:pPr lvl="1">
-              <a:buFont typeface="Arial" panose="020B0604020202020204" pitchFamily="34" charset="0"/>
-              <a:buChar char="•"/>
-            </a:pPr>
-            <a:r>
-              <a:rPr lang="en-GB" sz="900" b="1" i="0" u="none" strike="noStrike" dirty="0">
-                <a:solidFill>
-                  <a:schemeClr val="tx1"/>
-                </a:solidFill>
-                <a:effectLst/>
-                <a:latin typeface="+mj-lt"/>
-              </a:rPr>
-              <a:t>According to Recall:</a:t>
-            </a:r>
-            <a:r>
-              <a:rPr lang="en-GB" sz="900" b="0" i="0" u="none" strike="noStrike" dirty="0">
-                <a:solidFill>
-                  <a:schemeClr val="tx1"/>
-                </a:solidFill>
-                <a:effectLst/>
-                <a:latin typeface="+mj-lt"/>
-              </a:rPr>
-              <a:t> Logistic Regression takes the lead but is outperformed by </a:t>
-            </a:r>
-            <a:r>
-              <a:rPr lang="en-GB" sz="900" b="0" i="0" u="none" strike="noStrike" dirty="0" err="1">
-                <a:solidFill>
-                  <a:schemeClr val="tx1"/>
-                </a:solidFill>
-                <a:effectLst/>
-                <a:latin typeface="+mj-lt"/>
-              </a:rPr>
-              <a:t>XGBoost</a:t>
-            </a:r>
-            <a:r>
-              <a:rPr lang="en-GB" sz="900" b="0" i="0" u="none" strike="noStrike" dirty="0">
-                <a:solidFill>
-                  <a:schemeClr val="tx1"/>
-                </a:solidFill>
-                <a:effectLst/>
-                <a:latin typeface="+mj-lt"/>
-              </a:rPr>
-              <a:t> on other metrics.</a:t>
-            </a:r>
-          </a:p>
-          <a:p>
-            <a:pPr algn="l"/>
-            <a:r>
-              <a:rPr lang="en-GB" sz="900" b="1" i="0" u="none" strike="noStrike" dirty="0">
-                <a:solidFill>
-                  <a:schemeClr val="tx1"/>
-                </a:solidFill>
-                <a:effectLst/>
-                <a:latin typeface="+mj-lt"/>
-              </a:rPr>
-              <a:t>Conclusion:</a:t>
-            </a:r>
-            <a:r>
-              <a:rPr lang="en-GB" sz="900" b="0" i="0" u="none" strike="noStrike" dirty="0">
-                <a:solidFill>
-                  <a:schemeClr val="tx1"/>
-                </a:solidFill>
-                <a:effectLst/>
-                <a:latin typeface="+mj-lt"/>
-              </a:rPr>
-              <a:t> Considering all key performance metrics, including the highest ROC-AUC score, </a:t>
-            </a:r>
-            <a:r>
-              <a:rPr lang="en-GB" sz="900" b="0" i="0" u="none" strike="noStrike" dirty="0" err="1">
-                <a:solidFill>
-                  <a:schemeClr val="tx1"/>
-                </a:solidFill>
-                <a:effectLst/>
-                <a:latin typeface="+mj-lt"/>
-              </a:rPr>
-              <a:t>XGBoost</a:t>
-            </a:r>
-            <a:r>
-              <a:rPr lang="en-GB" sz="900" b="0" i="0" u="none" strike="noStrike" dirty="0">
-                <a:solidFill>
-                  <a:schemeClr val="tx1"/>
-                </a:solidFill>
-                <a:effectLst/>
-                <a:latin typeface="+mj-lt"/>
-              </a:rPr>
-              <a:t> emerges as the superior model, providing the most reliable and balanced performance for our dataset.</a:t>
-            </a:r>
-          </a:p>
-          <a:p>
-            <a:pPr marL="742950" lvl="1" indent="-285750" algn="l">
-              <a:buFont typeface="Arial" panose="020B0604020202020204" pitchFamily="34" charset="0"/>
-              <a:buChar char="•"/>
-            </a:pPr>
-            <a:endParaRPr lang="en-GB" sz="100" b="0" i="0" u="none" strike="noStrike" dirty="0">
-              <a:solidFill>
-                <a:schemeClr val="tx1"/>
-              </a:solidFill>
-              <a:effectLst/>
-              <a:latin typeface="+mj-lt"/>
-            </a:endParaRPr>
-          </a:p>
-          <a:p>
-            <a:pPr indent="-285750">
-              <a:buFont typeface="Arial" panose="020B0604020202020204" pitchFamily="34" charset="0"/>
-              <a:buChar char="•"/>
-            </a:pPr>
-            <a:endParaRPr lang="en-GB" sz="200" b="0" i="0" u="none" strike="noStrike" dirty="0">
-              <a:solidFill>
-                <a:schemeClr val="tx1"/>
-              </a:solidFill>
-              <a:effectLst/>
-              <a:latin typeface="+mj-lt"/>
-            </a:endParaRPr>
-          </a:p>
-          <a:p>
-            <a:endParaRPr lang="en-GB" sz="600" dirty="0"/>
+              <a:t>Incorporates built-in regularization, reducing overfitting and improving overall model performance.</a:t>
+            </a:r>
+          </a:p>
+          <a:p>
+            <a:endParaRPr lang="en-GB" dirty="0"/>
           </a:p>
         </p:txBody>
       </p:sp>
     </p:spTree>
     <p:extLst>
       <p:ext uri="{BB962C8B-B14F-4D97-AF65-F5344CB8AC3E}">
-        <p14:creationId xmlns:p14="http://schemas.microsoft.com/office/powerpoint/2010/main" val="1117034931"/>
+        <p14:creationId xmlns:p14="http://schemas.microsoft.com/office/powerpoint/2010/main" val="3819592931"/>
       </p:ext>
     </p:extLst>
   </p:cSld>
@@ -7487,7 +7067,7 @@
           <p:cNvPr id="2" name="Title 1">
             <a:extLst>
               <a:ext uri="{FF2B5EF4-FFF2-40B4-BE49-F238E27FC236}">
-                <a16:creationId xmlns:a16="http://schemas.microsoft.com/office/drawing/2014/main" id="{10A481D1-32AD-069B-2833-E1E88FF0E102}"/>
+                <a16:creationId xmlns:a16="http://schemas.microsoft.com/office/drawing/2014/main" id="{022137E8-EE06-4449-AF98-51E029B1B6A2}"/>
               </a:ext>
             </a:extLst>
           </p:cNvPr>
@@ -7505,312 +7085,104 @@
           <a:p>
             <a:r>
               <a:rPr lang="en-GB" dirty="0"/>
-              <a:t>Model Selection</a:t>
-            </a:r>
-          </a:p>
-        </p:txBody>
-      </p:sp>
-      <p:sp>
-        <p:nvSpPr>
-          <p:cNvPr id="3" name="Content Placeholder 2">
+              <a:t>Association Between </a:t>
+            </a:r>
+            <a:r>
+              <a:rPr lang="en-GB" dirty="0" err="1"/>
+              <a:t>Dexa</a:t>
+            </a:r>
+            <a:r>
+              <a:rPr lang="en-GB" dirty="0"/>
+              <a:t> Frequency and Number of Risks</a:t>
+            </a:r>
+          </a:p>
+        </p:txBody>
+      </p:sp>
+      <p:sp>
+        <p:nvSpPr>
+          <p:cNvPr id="7" name="TextBox 6">
             <a:extLst>
               <a:ext uri="{FF2B5EF4-FFF2-40B4-BE49-F238E27FC236}">
-                <a16:creationId xmlns:a16="http://schemas.microsoft.com/office/drawing/2014/main" id="{2788CAD1-6032-8895-675E-027EB042B14D}"/>
+                <a16:creationId xmlns:a16="http://schemas.microsoft.com/office/drawing/2014/main" id="{0EB52FF2-D380-D404-2D3D-7A4B0E22FD82}"/>
               </a:ext>
             </a:extLst>
           </p:cNvPr>
-          <p:cNvSpPr>
-            <a:spLocks noGrp="1"/>
-          </p:cNvSpPr>
-          <p:nvPr>
-            <p:ph idx="1"/>
-          </p:nvPr>
+          <p:cNvSpPr txBox="1"/>
+          <p:nvPr/>
         </p:nvSpPr>
         <p:spPr>
           <a:xfrm>
-            <a:off x="677334" y="1838738"/>
-            <a:ext cx="9659362" cy="4480919"/>
+            <a:off x="5637144" y="2759911"/>
+            <a:ext cx="3914360" cy="2585323"/>
           </a:xfrm>
+          <a:prstGeom prst="rect">
+            <a:avLst/>
+          </a:prstGeom>
+          <a:noFill/>
         </p:spPr>
         <p:txBody>
-          <a:bodyPr>
-            <a:normAutofit fontScale="70000" lnSpcReduction="20000"/>
+          <a:bodyPr wrap="square">
+            <a:spAutoFit/>
           </a:bodyPr>
           <a:lstStyle/>
           <a:p>
-            <a:pPr algn="l">
-              <a:buFont typeface="Arial" panose="020B0604020202020204" pitchFamily="34" charset="0"/>
-              <a:buChar char="•"/>
-            </a:pPr>
-            <a:r>
-              <a:rPr lang="en-GB" sz="2600" b="1" i="0" u="none" strike="noStrike" dirty="0">
-                <a:solidFill>
-                  <a:schemeClr val="tx1"/>
-                </a:solidFill>
-                <a:effectLst/>
-                <a:latin typeface="+mj-lt"/>
-              </a:rPr>
-              <a:t>3 Models were </a:t>
-            </a:r>
-            <a:r>
-              <a:rPr lang="en-GB" sz="2600" b="1" dirty="0">
-                <a:solidFill>
-                  <a:schemeClr val="tx1"/>
-                </a:solidFill>
-                <a:latin typeface="+mj-lt"/>
-              </a:rPr>
-              <a:t>c</a:t>
-            </a:r>
-            <a:r>
-              <a:rPr lang="en-GB" sz="2600" b="1" i="0" u="none" strike="noStrike" dirty="0">
-                <a:solidFill>
-                  <a:schemeClr val="tx1"/>
-                </a:solidFill>
-                <a:effectLst/>
-                <a:latin typeface="+mj-lt"/>
-              </a:rPr>
-              <a:t>hosen:</a:t>
-            </a:r>
-            <a:endParaRPr lang="en-GB" sz="2600" b="0" i="0" u="none" strike="noStrike" dirty="0">
-              <a:solidFill>
-                <a:schemeClr val="tx1"/>
-              </a:solidFill>
-              <a:effectLst/>
-              <a:latin typeface="+mj-lt"/>
-            </a:endParaRPr>
-          </a:p>
-          <a:p>
-            <a:pPr marL="742950" lvl="1" indent="-285750" algn="l">
-              <a:buFont typeface="Arial" panose="020B0604020202020204" pitchFamily="34" charset="0"/>
-              <a:buChar char="•"/>
-            </a:pPr>
-            <a:r>
-              <a:rPr lang="en-GB" sz="2600" b="1" i="0" u="none" strike="noStrike" dirty="0">
-                <a:solidFill>
-                  <a:schemeClr val="tx1"/>
-                </a:solidFill>
-                <a:effectLst/>
-                <a:latin typeface="+mj-lt"/>
-              </a:rPr>
-              <a:t>Logistic Regression (Baseline Measurement):</a:t>
-            </a:r>
-            <a:endParaRPr lang="en-GB" sz="2600" b="0" i="0" u="none" strike="noStrike" dirty="0">
-              <a:solidFill>
-                <a:schemeClr val="tx1"/>
-              </a:solidFill>
-              <a:effectLst/>
-              <a:latin typeface="+mj-lt"/>
-            </a:endParaRPr>
-          </a:p>
-          <a:p>
-            <a:pPr marL="1143000" lvl="2" indent="-228600" algn="l">
-              <a:buFont typeface="Arial" panose="020B0604020202020204" pitchFamily="34" charset="0"/>
-              <a:buChar char="•"/>
-            </a:pPr>
-            <a:r>
-              <a:rPr lang="en-GB" sz="2200" b="0" i="0" u="none" strike="noStrike" dirty="0">
-                <a:solidFill>
-                  <a:schemeClr val="tx1"/>
-                </a:solidFill>
-                <a:effectLst/>
-                <a:latin typeface="+mj-lt"/>
-              </a:rPr>
-              <a:t>Chosen for its simplicity and efficiency in binary classification tasks.</a:t>
-            </a:r>
-          </a:p>
-          <a:p>
-            <a:pPr marL="1143000" lvl="2" indent="-228600" algn="l">
-              <a:buFont typeface="Arial" panose="020B0604020202020204" pitchFamily="34" charset="0"/>
-              <a:buChar char="•"/>
-            </a:pPr>
-            <a:r>
-              <a:rPr lang="en-GB" sz="2200" b="0" i="0" u="none" strike="noStrike" dirty="0">
-                <a:solidFill>
-                  <a:schemeClr val="tx1"/>
-                </a:solidFill>
-                <a:effectLst/>
-                <a:latin typeface="+mj-lt"/>
-              </a:rPr>
-              <a:t>Provides clear probabilistic interpretation of model outputs.</a:t>
-            </a:r>
-          </a:p>
-          <a:p>
-            <a:pPr marL="1143000" lvl="2" indent="-228600" algn="l">
-              <a:buFont typeface="Arial" panose="020B0604020202020204" pitchFamily="34" charset="0"/>
-              <a:buChar char="•"/>
-            </a:pPr>
-            <a:r>
-              <a:rPr lang="en-GB" sz="2200" b="0" i="0" u="none" strike="noStrike" dirty="0">
-                <a:solidFill>
-                  <a:schemeClr val="tx1"/>
-                </a:solidFill>
-                <a:effectLst/>
-                <a:latin typeface="+mj-lt"/>
-              </a:rPr>
-              <a:t>Useful for understanding the influence of individual features on the outcome.</a:t>
-            </a:r>
-          </a:p>
-          <a:p>
-            <a:pPr marL="742950" lvl="1" indent="-285750" algn="l">
-              <a:buFont typeface="Arial" panose="020B0604020202020204" pitchFamily="34" charset="0"/>
-              <a:buChar char="•"/>
-            </a:pPr>
-            <a:r>
-              <a:rPr lang="en-GB" sz="2600" b="1" i="0" u="none" strike="noStrike" dirty="0">
-                <a:solidFill>
-                  <a:schemeClr val="tx1"/>
-                </a:solidFill>
-                <a:effectLst/>
-                <a:latin typeface="+mj-lt"/>
-              </a:rPr>
-              <a:t>Random Forest Classification:</a:t>
-            </a:r>
-            <a:endParaRPr lang="en-GB" sz="2600" b="0" i="0" u="none" strike="noStrike" dirty="0">
-              <a:solidFill>
-                <a:schemeClr val="tx1"/>
-              </a:solidFill>
-              <a:effectLst/>
-              <a:latin typeface="+mj-lt"/>
-            </a:endParaRPr>
-          </a:p>
-          <a:p>
-            <a:pPr marL="1143000" lvl="2" indent="-228600" algn="l">
-              <a:buFont typeface="Arial" panose="020B0604020202020204" pitchFamily="34" charset="0"/>
-              <a:buChar char="•"/>
-            </a:pPr>
-            <a:r>
-              <a:rPr lang="en-GB" sz="2200" b="0" i="0" u="none" strike="noStrike" dirty="0">
-                <a:solidFill>
-                  <a:schemeClr val="tx1"/>
-                </a:solidFill>
-                <a:effectLst/>
-                <a:latin typeface="+mj-lt"/>
-              </a:rPr>
-              <a:t>Selected for its robustness and ability to handle non-linear data.</a:t>
-            </a:r>
-          </a:p>
-          <a:p>
-            <a:pPr marL="1143000" lvl="2" indent="-228600" algn="l">
-              <a:buFont typeface="Arial" panose="020B0604020202020204" pitchFamily="34" charset="0"/>
-              <a:buChar char="•"/>
-            </a:pPr>
-            <a:r>
-              <a:rPr lang="en-GB" sz="2200" b="0" i="0" u="none" strike="noStrike" dirty="0">
-                <a:solidFill>
-                  <a:schemeClr val="tx1"/>
-                </a:solidFill>
-                <a:effectLst/>
-                <a:latin typeface="+mj-lt"/>
-              </a:rPr>
-              <a:t>Excels in handling large datasets with higher dimensionality.</a:t>
-            </a:r>
-          </a:p>
-          <a:p>
-            <a:pPr marL="1143000" lvl="2" indent="-228600" algn="l">
-              <a:buFont typeface="Arial" panose="020B0604020202020204" pitchFamily="34" charset="0"/>
-              <a:buChar char="•"/>
-            </a:pPr>
-            <a:r>
-              <a:rPr lang="en-GB" sz="2200" b="0" i="0" u="none" strike="noStrike" dirty="0">
-                <a:solidFill>
-                  <a:schemeClr val="tx1"/>
-                </a:solidFill>
-                <a:effectLst/>
-                <a:latin typeface="+mj-lt"/>
-              </a:rPr>
-              <a:t>Offers insights into feature importance, enhancing model interpretability.</a:t>
-            </a:r>
-          </a:p>
-          <a:p>
-            <a:pPr marL="742950" lvl="1" indent="-285750" algn="l">
-              <a:buFont typeface="Arial" panose="020B0604020202020204" pitchFamily="34" charset="0"/>
-              <a:buChar char="•"/>
-            </a:pPr>
-            <a:r>
-              <a:rPr lang="en-GB" sz="2600" b="1" i="0" u="none" strike="noStrike" dirty="0" err="1">
-                <a:solidFill>
-                  <a:schemeClr val="tx1"/>
-                </a:solidFill>
-                <a:effectLst/>
-                <a:latin typeface="+mj-lt"/>
-              </a:rPr>
-              <a:t>XGBoost</a:t>
-            </a:r>
-            <a:r>
-              <a:rPr lang="en-GB" sz="2600" b="1" i="0" u="none" strike="noStrike" dirty="0">
-                <a:solidFill>
-                  <a:schemeClr val="tx1"/>
-                </a:solidFill>
-                <a:effectLst/>
-                <a:latin typeface="+mj-lt"/>
-              </a:rPr>
-              <a:t>:</a:t>
-            </a:r>
-            <a:endParaRPr lang="en-GB" sz="2600" b="0" i="0" u="none" strike="noStrike" dirty="0">
-              <a:solidFill>
-                <a:schemeClr val="tx1"/>
-              </a:solidFill>
-              <a:effectLst/>
-              <a:latin typeface="+mj-lt"/>
-            </a:endParaRPr>
-          </a:p>
-          <a:p>
-            <a:pPr marL="1143000" lvl="2" indent="-228600" algn="l">
-              <a:buFont typeface="Arial" panose="020B0604020202020204" pitchFamily="34" charset="0"/>
-              <a:buChar char="•"/>
-            </a:pPr>
-            <a:r>
-              <a:rPr lang="en-GB" sz="2200" b="0" i="0" u="none" strike="noStrike" dirty="0">
-                <a:solidFill>
-                  <a:schemeClr val="tx1"/>
-                </a:solidFill>
-                <a:effectLst/>
-                <a:latin typeface="+mj-lt"/>
-              </a:rPr>
-              <a:t>Opted for its high performance and speed in training.</a:t>
-            </a:r>
-          </a:p>
-          <a:p>
-            <a:pPr marL="1143000" lvl="2" indent="-228600" algn="l">
-              <a:buFont typeface="Arial" panose="020B0604020202020204" pitchFamily="34" charset="0"/>
-              <a:buChar char="•"/>
-            </a:pPr>
-            <a:r>
-              <a:rPr lang="en-GB" sz="2200" b="0" i="0" u="none" strike="noStrike" dirty="0">
-                <a:solidFill>
-                  <a:schemeClr val="tx1"/>
-                </a:solidFill>
-                <a:effectLst/>
-                <a:latin typeface="+mj-lt"/>
-              </a:rPr>
-              <a:t>Known for delivering state-of-the-art results on many machine learning challenges.</a:t>
-            </a:r>
-          </a:p>
-          <a:p>
-            <a:pPr marL="1143000" lvl="2" indent="-228600" algn="l">
-              <a:buFont typeface="Arial" panose="020B0604020202020204" pitchFamily="34" charset="0"/>
-              <a:buChar char="•"/>
-            </a:pPr>
-            <a:r>
-              <a:rPr lang="en-GB" sz="2200" b="0" i="0" u="none" strike="noStrike" dirty="0">
-                <a:solidFill>
-                  <a:schemeClr val="tx1"/>
-                </a:solidFill>
-                <a:effectLst/>
-                <a:latin typeface="+mj-lt"/>
-              </a:rPr>
-              <a:t>Incorporates built-in regularization, reducing overfitting and improving overall model performance.</a:t>
-            </a:r>
-          </a:p>
-          <a:p>
-            <a:endParaRPr lang="en-GB" dirty="0"/>
-          </a:p>
-        </p:txBody>
-      </p:sp>
+            <a:r>
+              <a:rPr lang="en-GB" dirty="0"/>
+              <a:t>The scatter plot suggests a weak to no clear correlation between the frequency of </a:t>
+            </a:r>
+            <a:r>
+              <a:rPr lang="en-GB" dirty="0" err="1"/>
+              <a:t>Dexa</a:t>
+            </a:r>
+            <a:r>
+              <a:rPr lang="en-GB" dirty="0"/>
+              <a:t> during prescription and the count of risks. Data points are heavily clustered at lower values with few outliers, indicating that most observations have a low </a:t>
+            </a:r>
+            <a:r>
+              <a:rPr lang="en-GB" dirty="0" err="1"/>
+              <a:t>Dexa</a:t>
+            </a:r>
+            <a:r>
+              <a:rPr lang="en-GB" dirty="0"/>
+              <a:t> frequency irrespective of the number of risks.</a:t>
+            </a:r>
+          </a:p>
+        </p:txBody>
+      </p:sp>
+      <p:pic>
+        <p:nvPicPr>
+          <p:cNvPr id="8" name="Picture 7">
+            <a:extLst>
+              <a:ext uri="{FF2B5EF4-FFF2-40B4-BE49-F238E27FC236}">
+                <a16:creationId xmlns:a16="http://schemas.microsoft.com/office/drawing/2014/main" id="{1F1A73A3-FB1A-29FD-179B-C0BBFE455078}"/>
+              </a:ext>
+            </a:extLst>
+          </p:cNvPr>
+          <p:cNvPicPr>
+            <a:picLocks noChangeAspect="1"/>
+          </p:cNvPicPr>
+          <p:nvPr/>
+        </p:nvPicPr>
+        <p:blipFill>
+          <a:blip r:embed="rId2"/>
+          <a:stretch>
+            <a:fillRect/>
+          </a:stretch>
+        </p:blipFill>
+        <p:spPr>
+          <a:xfrm>
+            <a:off x="764207" y="2049393"/>
+            <a:ext cx="4592983" cy="4574463"/>
+          </a:xfrm>
+          <a:prstGeom prst="rect">
+            <a:avLst/>
+          </a:prstGeom>
+        </p:spPr>
+      </p:pic>
     </p:spTree>
     <p:extLst>
       <p:ext uri="{BB962C8B-B14F-4D97-AF65-F5344CB8AC3E}">
-        <p14:creationId xmlns:p14="http://schemas.microsoft.com/office/powerpoint/2010/main" val="3819592931"/>
+        <p14:creationId xmlns:p14="http://schemas.microsoft.com/office/powerpoint/2010/main" val="1971137552"/>
       </p:ext>
     </p:extLst>
   </p:cSld>
@@ -7842,7 +7214,7 @@
           <p:cNvPr id="2" name="Title 1">
             <a:extLst>
               <a:ext uri="{FF2B5EF4-FFF2-40B4-BE49-F238E27FC236}">
-                <a16:creationId xmlns:a16="http://schemas.microsoft.com/office/drawing/2014/main" id="{AE9211CD-AD2F-9DAD-9C66-CFC33F4C432C}"/>
+                <a16:creationId xmlns:a16="http://schemas.microsoft.com/office/drawing/2014/main" id="{579F81C8-774A-D66B-D2E5-ED4CA476594C}"/>
               </a:ext>
             </a:extLst>
           </p:cNvPr>
@@ -7860,7 +7232,15 @@
           <a:p>
             <a:r>
               <a:rPr lang="en-GB" dirty="0"/>
-              <a:t>Logistic Regression</a:t>
+              <a:t>Correlation Between </a:t>
+            </a:r>
+            <a:r>
+              <a:rPr lang="en-GB" dirty="0" err="1"/>
+              <a:t>Dexa</a:t>
+            </a:r>
+            <a:r>
+              <a:rPr lang="en-GB" dirty="0"/>
+              <a:t> Frequency and Risk Count</a:t>
             </a:r>
           </a:p>
         </p:txBody>
@@ -7870,7 +7250,7 @@
           <p:cNvPr id="3" name="Content Placeholder 2">
             <a:extLst>
               <a:ext uri="{FF2B5EF4-FFF2-40B4-BE49-F238E27FC236}">
-                <a16:creationId xmlns:a16="http://schemas.microsoft.com/office/drawing/2014/main" id="{2CEB710A-C9E9-65D2-D8C3-83455C21C8FC}"/>
+                <a16:creationId xmlns:a16="http://schemas.microsoft.com/office/drawing/2014/main" id="{B22BC2B2-C949-727F-7564-7B752F9F5370}"/>
               </a:ext>
             </a:extLst>
           </p:cNvPr>
@@ -7883,311 +7263,25 @@
         </p:nvSpPr>
         <p:spPr>
           <a:xfrm>
-            <a:off x="677334" y="1600201"/>
-            <a:ext cx="8596668" cy="4441162"/>
+            <a:off x="677334" y="2160589"/>
+            <a:ext cx="5418666" cy="3829394"/>
           </a:xfrm>
         </p:spPr>
         <p:txBody>
-          <a:bodyPr>
-            <a:normAutofit fontScale="92500" lnSpcReduction="10000"/>
-          </a:bodyPr>
-          <a:lstStyle/>
-          <a:p>
-            <a:pPr algn="l">
-              <a:buFont typeface="Arial" panose="020B0604020202020204" pitchFamily="34" charset="0"/>
-              <a:buChar char="•"/>
-            </a:pPr>
-            <a:r>
-              <a:rPr lang="en-GB" b="1" i="0" u="none" strike="noStrike" dirty="0">
-                <a:solidFill>
-                  <a:schemeClr val="tx1"/>
-                </a:solidFill>
-                <a:effectLst/>
-                <a:latin typeface="+mj-lt"/>
-              </a:rPr>
-              <a:t>Performance Metrics in Percentages:</a:t>
-            </a:r>
-            <a:endParaRPr lang="en-GB" b="0" i="0" u="none" strike="noStrike" dirty="0">
-              <a:solidFill>
-                <a:schemeClr val="tx1"/>
-              </a:solidFill>
-              <a:effectLst/>
-              <a:latin typeface="+mj-lt"/>
-            </a:endParaRPr>
-          </a:p>
-          <a:p>
-            <a:pPr marL="742950" lvl="1" indent="-285750" algn="l">
-              <a:buFont typeface="Arial" panose="020B0604020202020204" pitchFamily="34" charset="0"/>
-              <a:buChar char="•"/>
-            </a:pPr>
-            <a:r>
-              <a:rPr lang="en-GB" b="1" i="0" u="none" strike="noStrike" dirty="0">
-                <a:solidFill>
-                  <a:schemeClr val="tx1"/>
-                </a:solidFill>
-                <a:effectLst/>
-                <a:latin typeface="+mj-lt"/>
-              </a:rPr>
-              <a:t>Logistic Regression Accuracy:</a:t>
-            </a:r>
-            <a:r>
-              <a:rPr lang="en-GB" b="0" i="0" u="none" strike="noStrike" dirty="0">
-                <a:solidFill>
-                  <a:schemeClr val="tx1"/>
-                </a:solidFill>
-                <a:effectLst/>
-                <a:latin typeface="+mj-lt"/>
-              </a:rPr>
-              <a:t> 84.09%</a:t>
-            </a:r>
-          </a:p>
-          <a:p>
-            <a:pPr marL="742950" lvl="1" indent="-285750" algn="l">
-              <a:buFont typeface="Arial" panose="020B0604020202020204" pitchFamily="34" charset="0"/>
-              <a:buChar char="•"/>
-            </a:pPr>
-            <a:r>
-              <a:rPr lang="en-GB" b="1" i="0" u="none" strike="noStrike" dirty="0">
-                <a:solidFill>
-                  <a:schemeClr val="tx1"/>
-                </a:solidFill>
-                <a:effectLst/>
-                <a:latin typeface="+mj-lt"/>
-              </a:rPr>
-              <a:t>Logistic Regression Precision:</a:t>
-            </a:r>
-            <a:r>
-              <a:rPr lang="en-GB" b="0" i="0" u="none" strike="noStrike" dirty="0">
-                <a:solidFill>
-                  <a:schemeClr val="tx1"/>
-                </a:solidFill>
-                <a:effectLst/>
-                <a:latin typeface="+mj-lt"/>
-              </a:rPr>
-              <a:t> 83.71%</a:t>
-            </a:r>
-          </a:p>
-          <a:p>
-            <a:pPr marL="742950" lvl="1" indent="-285750" algn="l">
-              <a:buFont typeface="Arial" panose="020B0604020202020204" pitchFamily="34" charset="0"/>
-              <a:buChar char="•"/>
-            </a:pPr>
-            <a:r>
-              <a:rPr lang="en-GB" b="1" i="0" u="none" strike="noStrike" dirty="0">
-                <a:solidFill>
-                  <a:schemeClr val="tx1"/>
-                </a:solidFill>
-                <a:effectLst/>
-                <a:latin typeface="+mj-lt"/>
-              </a:rPr>
-              <a:t>Logistic Regression Recall:</a:t>
-            </a:r>
-            <a:r>
-              <a:rPr lang="en-GB" b="0" i="0" u="none" strike="noStrike" dirty="0">
-                <a:solidFill>
-                  <a:schemeClr val="tx1"/>
-                </a:solidFill>
-                <a:effectLst/>
-                <a:latin typeface="+mj-lt"/>
-              </a:rPr>
-              <a:t> 73.71%</a:t>
-            </a:r>
-          </a:p>
-          <a:p>
-            <a:pPr marL="742950" lvl="1" indent="-285750" algn="l">
-              <a:buFont typeface="Arial" panose="020B0604020202020204" pitchFamily="34" charset="0"/>
-              <a:buChar char="•"/>
-            </a:pPr>
-            <a:r>
-              <a:rPr lang="en-GB" b="1" i="0" u="none" strike="noStrike" dirty="0">
-                <a:solidFill>
-                  <a:schemeClr val="tx1"/>
-                </a:solidFill>
-                <a:effectLst/>
-                <a:latin typeface="+mj-lt"/>
-              </a:rPr>
-              <a:t>Logistic Regression F1 Score:</a:t>
-            </a:r>
-            <a:r>
-              <a:rPr lang="en-GB" b="0" i="0" u="none" strike="noStrike" dirty="0">
-                <a:solidFill>
-                  <a:schemeClr val="tx1"/>
-                </a:solidFill>
-                <a:effectLst/>
-                <a:latin typeface="+mj-lt"/>
-              </a:rPr>
-              <a:t> 78.39%</a:t>
-            </a:r>
-          </a:p>
-          <a:p>
-            <a:pPr algn="l">
-              <a:buFont typeface="Arial" panose="020B0604020202020204" pitchFamily="34" charset="0"/>
-              <a:buChar char="•"/>
-            </a:pPr>
-            <a:r>
-              <a:rPr lang="en-GB" b="1" i="0" u="none" strike="noStrike" dirty="0">
-                <a:solidFill>
-                  <a:schemeClr val="tx1"/>
-                </a:solidFill>
-                <a:effectLst/>
-                <a:latin typeface="+mj-lt"/>
-              </a:rPr>
-              <a:t>Best Hyperparameters and Accuracies:</a:t>
-            </a:r>
-            <a:endParaRPr lang="en-GB" b="0" i="0" u="none" strike="noStrike" dirty="0">
-              <a:solidFill>
-                <a:schemeClr val="tx1"/>
-              </a:solidFill>
-              <a:effectLst/>
-              <a:latin typeface="+mj-lt"/>
-            </a:endParaRPr>
-          </a:p>
-          <a:p>
-            <a:pPr marL="742950" lvl="1" indent="-285750" algn="l">
-              <a:buFont typeface="Arial" panose="020B0604020202020204" pitchFamily="34" charset="0"/>
-              <a:buChar char="•"/>
-            </a:pPr>
-            <a:r>
-              <a:rPr lang="en-GB" b="1" i="0" u="none" strike="noStrike" dirty="0">
-                <a:solidFill>
-                  <a:schemeClr val="tx1"/>
-                </a:solidFill>
-                <a:effectLst/>
-                <a:latin typeface="+mj-lt"/>
-              </a:rPr>
-              <a:t>Best Hyperparameters:</a:t>
-            </a:r>
-            <a:endParaRPr lang="en-GB" b="0" i="0" u="none" strike="noStrike" dirty="0">
-              <a:solidFill>
-                <a:schemeClr val="tx1"/>
-              </a:solidFill>
-              <a:effectLst/>
-              <a:latin typeface="+mj-lt"/>
-            </a:endParaRPr>
-          </a:p>
-          <a:p>
-            <a:pPr marL="1143000" lvl="2" indent="-228600" algn="l">
-              <a:buFont typeface="Arial" panose="020B0604020202020204" pitchFamily="34" charset="0"/>
-              <a:buChar char="•"/>
-            </a:pPr>
-            <a:r>
-              <a:rPr lang="en-GB" b="0" i="0" u="none" strike="noStrike" dirty="0">
-                <a:solidFill>
-                  <a:schemeClr val="tx1"/>
-                </a:solidFill>
-                <a:effectLst/>
-                <a:latin typeface="+mj-lt"/>
-              </a:rPr>
-              <a:t>Regularization Strength ('C'): 0.1</a:t>
-            </a:r>
-          </a:p>
-          <a:p>
-            <a:pPr marL="1143000" lvl="2" indent="-228600" algn="l">
-              <a:buFont typeface="Arial" panose="020B0604020202020204" pitchFamily="34" charset="0"/>
-              <a:buChar char="•"/>
-            </a:pPr>
-            <a:r>
-              <a:rPr lang="en-GB" b="0" i="0" u="none" strike="noStrike" dirty="0">
-                <a:solidFill>
-                  <a:schemeClr val="tx1"/>
-                </a:solidFill>
-                <a:effectLst/>
-                <a:latin typeface="+mj-lt"/>
-              </a:rPr>
-              <a:t>Penalty: L2 (Ridge regression)</a:t>
-            </a:r>
-          </a:p>
-          <a:p>
-            <a:pPr marL="742950" lvl="1" indent="-285750" algn="l">
-              <a:buFont typeface="Arial" panose="020B0604020202020204" pitchFamily="34" charset="0"/>
-              <a:buChar char="•"/>
-            </a:pPr>
-            <a:r>
-              <a:rPr lang="en-GB" b="1" i="0" u="none" strike="noStrike" dirty="0">
-                <a:solidFill>
-                  <a:schemeClr val="tx1"/>
-                </a:solidFill>
-                <a:effectLst/>
-                <a:latin typeface="+mj-lt"/>
-              </a:rPr>
-              <a:t>Best Training Accuracy:</a:t>
-            </a:r>
-            <a:r>
-              <a:rPr lang="en-GB" b="0" i="0" u="none" strike="noStrike" dirty="0">
-                <a:solidFill>
-                  <a:schemeClr val="tx1"/>
-                </a:solidFill>
-                <a:effectLst/>
-                <a:latin typeface="+mj-lt"/>
-              </a:rPr>
-              <a:t> 82.44%</a:t>
-            </a:r>
-          </a:p>
-          <a:p>
-            <a:pPr marL="742950" lvl="1" indent="-285750" algn="l">
-              <a:buFont typeface="Arial" panose="020B0604020202020204" pitchFamily="34" charset="0"/>
-              <a:buChar char="•"/>
-            </a:pPr>
-            <a:r>
-              <a:rPr lang="en-GB" b="1" i="0" u="none" strike="noStrike" dirty="0">
-                <a:solidFill>
-                  <a:schemeClr val="tx1"/>
-                </a:solidFill>
-                <a:effectLst/>
-                <a:latin typeface="+mj-lt"/>
-              </a:rPr>
-              <a:t>Best Validation Accuracy:</a:t>
-            </a:r>
-            <a:r>
-              <a:rPr lang="en-GB" b="0" i="0" u="none" strike="noStrike" dirty="0">
-                <a:solidFill>
-                  <a:schemeClr val="tx1"/>
-                </a:solidFill>
-                <a:effectLst/>
-                <a:latin typeface="+mj-lt"/>
-              </a:rPr>
-              <a:t> 80.75%</a:t>
-            </a:r>
-          </a:p>
-          <a:p>
-            <a:pPr marL="742950" lvl="1" indent="-285750" algn="l">
-              <a:buFont typeface="Arial" panose="020B0604020202020204" pitchFamily="34" charset="0"/>
-              <a:buChar char="•"/>
-            </a:pPr>
-            <a:r>
-              <a:rPr lang="en-GB" b="1" i="0" u="none" strike="noStrike" dirty="0">
-                <a:solidFill>
-                  <a:schemeClr val="tx1"/>
-                </a:solidFill>
-                <a:effectLst/>
-                <a:latin typeface="+mj-lt"/>
-              </a:rPr>
-              <a:t>Best Test Accuracy (using best parameters):</a:t>
-            </a:r>
-            <a:r>
-              <a:rPr lang="en-GB" b="0" i="0" u="none" strike="noStrike" dirty="0">
-                <a:solidFill>
-                  <a:schemeClr val="tx1"/>
-                </a:solidFill>
-                <a:effectLst/>
-                <a:latin typeface="+mj-lt"/>
-              </a:rPr>
-              <a:t> 84.09%</a:t>
-            </a:r>
-          </a:p>
-          <a:p>
-            <a:pPr>
-              <a:buFont typeface="Arial" panose="020B0604020202020204" pitchFamily="34" charset="0"/>
-              <a:buChar char="•"/>
-            </a:pPr>
-            <a:r>
-              <a:rPr lang="en-GB" dirty="0">
-                <a:solidFill>
-                  <a:schemeClr val="tx1"/>
-                </a:solidFill>
-                <a:latin typeface="+mj-lt"/>
-              </a:rPr>
-              <a:t>Logistic Regression ROC-AUC Score: 90.15%</a:t>
+          <a:bodyPr/>
+          <a:lstStyle/>
+          <a:p>
+            <a:r>
+              <a:rPr lang="en-GB" dirty="0"/>
+              <a:t>The correlation heatmap shows a very weak positive correlation (0.011) between </a:t>
+            </a:r>
+            <a:r>
+              <a:rPr lang="en-GB" dirty="0" err="1"/>
+              <a:t>Dexa</a:t>
+            </a:r>
+            <a:r>
+              <a:rPr lang="en-GB" dirty="0"/>
+              <a:t> frequency and risk count. This implies that there is no significant linear relationship between these two variables.</a:t>
             </a:r>
           </a:p>
         </p:txBody>
@@ -8197,7 +7291,7 @@
           <p:cNvPr id="4" name="Picture 3">
             <a:extLst>
               <a:ext uri="{FF2B5EF4-FFF2-40B4-BE49-F238E27FC236}">
-                <a16:creationId xmlns:a16="http://schemas.microsoft.com/office/drawing/2014/main" id="{4E3E6E33-347D-111F-A210-61AFEBFBEF78}"/>
+                <a16:creationId xmlns:a16="http://schemas.microsoft.com/office/drawing/2014/main" id="{20088FD3-1E6B-2084-49AC-F273F852D2B0}"/>
               </a:ext>
             </a:extLst>
           </p:cNvPr>
@@ -8206,46 +7300,15 @@
           </p:cNvPicPr>
           <p:nvPr/>
         </p:nvPicPr>
-        <p:blipFill>
+        <p:blipFill rotWithShape="1">
           <a:blip r:embed="rId2"/>
-          <a:stretch>
-            <a:fillRect/>
-          </a:stretch>
+          <a:srcRect l="52259"/>
+          <a:stretch/>
         </p:blipFill>
         <p:spPr>
           <a:xfrm>
-            <a:off x="8521424" y="491357"/>
-            <a:ext cx="3594100" cy="3068481"/>
-          </a:xfrm>
-          <a:prstGeom prst="rect">
-            <a:avLst/>
-          </a:prstGeom>
-        </p:spPr>
-      </p:pic>
-      <p:pic>
-        <p:nvPicPr>
-          <p:cNvPr id="5" name="Picture 4">
-            <a:extLst>
-              <a:ext uri="{FF2B5EF4-FFF2-40B4-BE49-F238E27FC236}">
-                <a16:creationId xmlns:a16="http://schemas.microsoft.com/office/drawing/2014/main" id="{E38F3672-B082-3880-2F0B-C99D9551EFE0}"/>
-              </a:ext>
-            </a:extLst>
-          </p:cNvPr>
-          <p:cNvPicPr>
-            <a:picLocks noChangeAspect="1"/>
-          </p:cNvPicPr>
-          <p:nvPr/>
-        </p:nvPicPr>
-        <p:blipFill>
-          <a:blip r:embed="rId3"/>
-          <a:stretch>
-            <a:fillRect/>
-          </a:stretch>
-        </p:blipFill>
-        <p:spPr>
-          <a:xfrm>
-            <a:off x="8521424" y="3559838"/>
-            <a:ext cx="3594100" cy="2882900"/>
+            <a:off x="6096000" y="1525735"/>
+            <a:ext cx="4869410" cy="4464248"/>
           </a:xfrm>
           <a:prstGeom prst="rect">
             <a:avLst/>
@@ -8255,7 +7318,7 @@
     </p:spTree>
     <p:extLst>
       <p:ext uri="{BB962C8B-B14F-4D97-AF65-F5344CB8AC3E}">
-        <p14:creationId xmlns:p14="http://schemas.microsoft.com/office/powerpoint/2010/main" val="1402055865"/>
+        <p14:creationId xmlns:p14="http://schemas.microsoft.com/office/powerpoint/2010/main" val="3720343464"/>
       </p:ext>
     </p:extLst>
   </p:cSld>
@@ -8287,7 +7350,7 @@
           <p:cNvPr id="2" name="Title 1">
             <a:extLst>
               <a:ext uri="{FF2B5EF4-FFF2-40B4-BE49-F238E27FC236}">
-                <a16:creationId xmlns:a16="http://schemas.microsoft.com/office/drawing/2014/main" id="{44F3E81A-B5E2-0A7F-EBEF-05969ECC8F25}"/>
+                <a16:creationId xmlns:a16="http://schemas.microsoft.com/office/drawing/2014/main" id="{A341C485-A848-FAB9-2B11-1F2EFA8C10D1}"/>
               </a:ext>
             </a:extLst>
           </p:cNvPr>
@@ -8298,455 +7361,66 @@
             <p:ph type="title"/>
           </p:nvPr>
         </p:nvSpPr>
-        <p:spPr/>
-        <p:txBody>
-          <a:bodyPr/>
+        <p:spPr>
+          <a:xfrm>
+            <a:off x="677334" y="609600"/>
+            <a:ext cx="7671536" cy="1320800"/>
+          </a:xfrm>
+        </p:spPr>
+        <p:txBody>
+          <a:bodyPr>
+            <a:normAutofit fontScale="90000"/>
+          </a:bodyPr>
           <a:lstStyle/>
           <a:p>
             <a:r>
               <a:rPr lang="en-GB" dirty="0"/>
-              <a:t>Random Forest Classification</a:t>
-            </a:r>
-          </a:p>
-        </p:txBody>
-      </p:sp>
-      <p:sp>
-        <p:nvSpPr>
-          <p:cNvPr id="3" name="Content Placeholder 2">
+              <a:t>Impact of Ethnicity, Region, and Other Factors on Treatment Persistency</a:t>
+            </a:r>
+          </a:p>
+        </p:txBody>
+      </p:sp>
+      <p:sp>
+        <p:nvSpPr>
+          <p:cNvPr id="6" name="TextBox 5">
             <a:extLst>
               <a:ext uri="{FF2B5EF4-FFF2-40B4-BE49-F238E27FC236}">
-                <a16:creationId xmlns:a16="http://schemas.microsoft.com/office/drawing/2014/main" id="{04ABB973-749A-B479-38BF-2566BBE8F0D1}"/>
+                <a16:creationId xmlns:a16="http://schemas.microsoft.com/office/drawing/2014/main" id="{7E9680B9-FD48-78DF-61CE-9657B3078C04}"/>
               </a:ext>
             </a:extLst>
           </p:cNvPr>
-          <p:cNvSpPr>
-            <a:spLocks noGrp="1"/>
-          </p:cNvSpPr>
-          <p:nvPr>
-            <p:ph idx="1"/>
-          </p:nvPr>
+          <p:cNvSpPr txBox="1"/>
+          <p:nvPr/>
         </p:nvSpPr>
         <p:spPr>
           <a:xfrm>
-            <a:off x="677334" y="1699591"/>
-            <a:ext cx="8764840" cy="4341771"/>
+            <a:off x="1146312" y="2522668"/>
+            <a:ext cx="6102626" cy="2031325"/>
           </a:xfrm>
+          <a:prstGeom prst="rect">
+            <a:avLst/>
+          </a:prstGeom>
+          <a:noFill/>
         </p:spPr>
         <p:txBody>
-          <a:bodyPr>
-            <a:normAutofit fontScale="85000" lnSpcReduction="20000"/>
+          <a:bodyPr wrap="square">
+            <a:spAutoFit/>
           </a:bodyPr>
           <a:lstStyle/>
           <a:p>
-            <a:pPr algn="l">
-              <a:buFont typeface="Arial" panose="020B0604020202020204" pitchFamily="34" charset="0"/>
-              <a:buChar char="•"/>
-            </a:pPr>
-            <a:r>
-              <a:rPr lang="en-GB" b="1" i="0" u="none" strike="noStrike" dirty="0">
-                <a:solidFill>
-                  <a:schemeClr val="tx1"/>
-                </a:solidFill>
-                <a:effectLst/>
-                <a:latin typeface="+mj-lt"/>
-              </a:rPr>
-              <a:t>Performance Metrics in Percentages:</a:t>
-            </a:r>
-            <a:endParaRPr lang="en-GB" b="0" i="0" u="none" strike="noStrike" dirty="0">
-              <a:solidFill>
-                <a:schemeClr val="tx1"/>
-              </a:solidFill>
-              <a:effectLst/>
-              <a:latin typeface="+mj-lt"/>
-            </a:endParaRPr>
-          </a:p>
-          <a:p>
-            <a:pPr marL="742950" lvl="1" indent="-285750" algn="l">
-              <a:buFont typeface="Arial" panose="020B0604020202020204" pitchFamily="34" charset="0"/>
-              <a:buChar char="•"/>
-            </a:pPr>
-            <a:r>
-              <a:rPr lang="en-GB" b="1" i="0" u="none" strike="noStrike" dirty="0">
-                <a:solidFill>
-                  <a:schemeClr val="tx1"/>
-                </a:solidFill>
-                <a:effectLst/>
-                <a:latin typeface="+mj-lt"/>
-              </a:rPr>
-              <a:t>Random Forest Accuracy:</a:t>
-            </a:r>
-            <a:r>
-              <a:rPr lang="en-GB" b="0" i="0" u="none" strike="noStrike" dirty="0">
-                <a:solidFill>
-                  <a:schemeClr val="tx1"/>
-                </a:solidFill>
-                <a:effectLst/>
-                <a:latin typeface="+mj-lt"/>
-              </a:rPr>
-              <a:t> 82.53%</a:t>
-            </a:r>
-          </a:p>
-          <a:p>
-            <a:pPr marL="742950" lvl="1" indent="-285750" algn="l">
-              <a:buFont typeface="Arial" panose="020B0604020202020204" pitchFamily="34" charset="0"/>
-              <a:buChar char="•"/>
-            </a:pPr>
-            <a:r>
-              <a:rPr lang="en-GB" b="1" i="0" u="none" strike="noStrike" dirty="0">
-                <a:solidFill>
-                  <a:schemeClr val="tx1"/>
-                </a:solidFill>
-                <a:effectLst/>
-                <a:latin typeface="+mj-lt"/>
-              </a:rPr>
-              <a:t>Random Forest Precision:</a:t>
-            </a:r>
-            <a:r>
-              <a:rPr lang="en-GB" b="0" i="0" u="none" strike="noStrike" dirty="0">
-                <a:solidFill>
-                  <a:schemeClr val="tx1"/>
-                </a:solidFill>
-                <a:effectLst/>
-                <a:latin typeface="+mj-lt"/>
-              </a:rPr>
-              <a:t> 82.03%</a:t>
-            </a:r>
-          </a:p>
-          <a:p>
-            <a:pPr marL="742950" lvl="1" indent="-285750" algn="l">
-              <a:buFont typeface="Arial" panose="020B0604020202020204" pitchFamily="34" charset="0"/>
-              <a:buChar char="•"/>
-            </a:pPr>
-            <a:r>
-              <a:rPr lang="en-GB" b="1" i="0" u="none" strike="noStrike" dirty="0">
-                <a:solidFill>
-                  <a:schemeClr val="tx1"/>
-                </a:solidFill>
-                <a:effectLst/>
-                <a:latin typeface="+mj-lt"/>
-              </a:rPr>
-              <a:t>Random Forest Recall:</a:t>
-            </a:r>
-            <a:r>
-              <a:rPr lang="en-GB" b="0" i="0" u="none" strike="noStrike" dirty="0">
-                <a:solidFill>
-                  <a:schemeClr val="tx1"/>
-                </a:solidFill>
-                <a:effectLst/>
-                <a:latin typeface="+mj-lt"/>
-              </a:rPr>
-              <a:t> 70.92%</a:t>
-            </a:r>
-          </a:p>
-          <a:p>
-            <a:pPr marL="742950" lvl="1" indent="-285750" algn="l">
-              <a:buFont typeface="Arial" panose="020B0604020202020204" pitchFamily="34" charset="0"/>
-              <a:buChar char="•"/>
-            </a:pPr>
-            <a:r>
-              <a:rPr lang="en-GB" b="1" i="0" u="none" strike="noStrike" dirty="0">
-                <a:solidFill>
-                  <a:schemeClr val="tx1"/>
-                </a:solidFill>
-                <a:effectLst/>
-                <a:latin typeface="+mj-lt"/>
-              </a:rPr>
-              <a:t>Random Forest F1 Score:</a:t>
-            </a:r>
-            <a:r>
-              <a:rPr lang="en-GB" b="0" i="0" u="none" strike="noStrike" dirty="0">
-                <a:solidFill>
-                  <a:schemeClr val="tx1"/>
-                </a:solidFill>
-                <a:effectLst/>
-                <a:latin typeface="+mj-lt"/>
-              </a:rPr>
-              <a:t> 76.07%</a:t>
-            </a:r>
-          </a:p>
-          <a:p>
-            <a:pPr algn="l">
-              <a:buFont typeface="Arial" panose="020B0604020202020204" pitchFamily="34" charset="0"/>
-              <a:buChar char="•"/>
-            </a:pPr>
-            <a:r>
-              <a:rPr lang="en-GB" b="1" i="0" u="none" strike="noStrike" dirty="0">
-                <a:solidFill>
-                  <a:schemeClr val="tx1"/>
-                </a:solidFill>
-                <a:effectLst/>
-                <a:latin typeface="+mj-lt"/>
-              </a:rPr>
-              <a:t>Best Hyperparameters and Accuracies:</a:t>
-            </a:r>
-            <a:endParaRPr lang="en-GB" b="0" i="0" u="none" strike="noStrike" dirty="0">
-              <a:solidFill>
-                <a:schemeClr val="tx1"/>
-              </a:solidFill>
-              <a:effectLst/>
-              <a:latin typeface="+mj-lt"/>
-            </a:endParaRPr>
-          </a:p>
-          <a:p>
-            <a:pPr marL="742950" lvl="1" indent="-285750" algn="l">
-              <a:buFont typeface="Arial" panose="020B0604020202020204" pitchFamily="34" charset="0"/>
-              <a:buChar char="•"/>
-            </a:pPr>
-            <a:r>
-              <a:rPr lang="en-GB" b="1" i="0" u="none" strike="noStrike" dirty="0">
-                <a:solidFill>
-                  <a:schemeClr val="tx1"/>
-                </a:solidFill>
-                <a:effectLst/>
-                <a:latin typeface="+mj-lt"/>
-              </a:rPr>
-              <a:t>Best Hyperparameters:</a:t>
-            </a:r>
-            <a:endParaRPr lang="en-GB" b="0" i="0" u="none" strike="noStrike" dirty="0">
-              <a:solidFill>
-                <a:schemeClr val="tx1"/>
-              </a:solidFill>
-              <a:effectLst/>
-              <a:latin typeface="+mj-lt"/>
-            </a:endParaRPr>
-          </a:p>
-          <a:p>
-            <a:pPr marL="1143000" lvl="2" indent="-228600" algn="l">
-              <a:buFont typeface="Arial" panose="020B0604020202020204" pitchFamily="34" charset="0"/>
-              <a:buChar char="•"/>
-            </a:pPr>
-            <a:r>
-              <a:rPr lang="en-GB" b="0" i="0" u="none" strike="noStrike" dirty="0">
-                <a:solidFill>
-                  <a:schemeClr val="tx1"/>
-                </a:solidFill>
-                <a:effectLst/>
-                <a:latin typeface="+mj-lt"/>
-              </a:rPr>
-              <a:t>Maximum Depth of Trees ('</a:t>
-            </a:r>
-            <a:r>
-              <a:rPr lang="en-GB" b="0" i="0" u="none" strike="noStrike" dirty="0" err="1">
-                <a:solidFill>
-                  <a:schemeClr val="tx1"/>
-                </a:solidFill>
-                <a:effectLst/>
-                <a:latin typeface="+mj-lt"/>
-              </a:rPr>
-              <a:t>max_depth</a:t>
-            </a:r>
-            <a:r>
-              <a:rPr lang="en-GB" b="0" i="0" u="none" strike="noStrike" dirty="0">
-                <a:solidFill>
-                  <a:schemeClr val="tx1"/>
-                </a:solidFill>
-                <a:effectLst/>
-                <a:latin typeface="+mj-lt"/>
-              </a:rPr>
-              <a:t>'): 10</a:t>
-            </a:r>
-          </a:p>
-          <a:p>
-            <a:pPr marL="1143000" lvl="2" indent="-228600" algn="l">
-              <a:buFont typeface="Arial" panose="020B0604020202020204" pitchFamily="34" charset="0"/>
-              <a:buChar char="•"/>
-            </a:pPr>
-            <a:r>
-              <a:rPr lang="en-GB" b="0" i="0" u="none" strike="noStrike" dirty="0">
-                <a:solidFill>
-                  <a:schemeClr val="tx1"/>
-                </a:solidFill>
-                <a:effectLst/>
-                <a:latin typeface="+mj-lt"/>
-              </a:rPr>
-              <a:t>Minimum Number of Samples Required to Split a Node ('</a:t>
-            </a:r>
-            <a:r>
-              <a:rPr lang="en-GB" b="0" i="0" u="none" strike="noStrike" dirty="0" err="1">
-                <a:solidFill>
-                  <a:schemeClr val="tx1"/>
-                </a:solidFill>
-                <a:effectLst/>
-                <a:latin typeface="+mj-lt"/>
-              </a:rPr>
-              <a:t>min_samples_split</a:t>
-            </a:r>
-            <a:r>
-              <a:rPr lang="en-GB" b="0" i="0" u="none" strike="noStrike" dirty="0">
-                <a:solidFill>
-                  <a:schemeClr val="tx1"/>
-                </a:solidFill>
-                <a:effectLst/>
-                <a:latin typeface="+mj-lt"/>
-              </a:rPr>
-              <a:t>'): 2</a:t>
-            </a:r>
-          </a:p>
-          <a:p>
-            <a:pPr marL="1143000" lvl="2" indent="-228600" algn="l">
-              <a:buFont typeface="Arial" panose="020B0604020202020204" pitchFamily="34" charset="0"/>
-              <a:buChar char="•"/>
-            </a:pPr>
-            <a:r>
-              <a:rPr lang="en-GB" b="0" i="0" u="none" strike="noStrike" dirty="0">
-                <a:solidFill>
-                  <a:schemeClr val="tx1"/>
-                </a:solidFill>
-                <a:effectLst/>
-                <a:latin typeface="+mj-lt"/>
-              </a:rPr>
-              <a:t>Number of Trees in the Forest ('</a:t>
-            </a:r>
-            <a:r>
-              <a:rPr lang="en-GB" b="0" i="0" u="none" strike="noStrike" dirty="0" err="1">
-                <a:solidFill>
-                  <a:schemeClr val="tx1"/>
-                </a:solidFill>
-                <a:effectLst/>
-                <a:latin typeface="+mj-lt"/>
-              </a:rPr>
-              <a:t>n_estimators</a:t>
-            </a:r>
-            <a:r>
-              <a:rPr lang="en-GB" b="0" i="0" u="none" strike="noStrike" dirty="0">
-                <a:solidFill>
-                  <a:schemeClr val="tx1"/>
-                </a:solidFill>
-                <a:effectLst/>
-                <a:latin typeface="+mj-lt"/>
-              </a:rPr>
-              <a:t>'): 100</a:t>
-            </a:r>
-          </a:p>
-          <a:p>
-            <a:pPr marL="742950" lvl="1" indent="-285750" algn="l">
-              <a:buFont typeface="Arial" panose="020B0604020202020204" pitchFamily="34" charset="0"/>
-              <a:buChar char="•"/>
-            </a:pPr>
-            <a:r>
-              <a:rPr lang="en-GB" b="1" i="0" u="none" strike="noStrike" dirty="0">
-                <a:solidFill>
-                  <a:schemeClr val="tx1"/>
-                </a:solidFill>
-                <a:effectLst/>
-                <a:latin typeface="+mj-lt"/>
-              </a:rPr>
-              <a:t>Best Training Accuracy:</a:t>
-            </a:r>
-            <a:r>
-              <a:rPr lang="en-GB" b="0" i="0" u="none" strike="noStrike" dirty="0">
-                <a:solidFill>
-                  <a:schemeClr val="tx1"/>
-                </a:solidFill>
-                <a:effectLst/>
-                <a:latin typeface="+mj-lt"/>
-              </a:rPr>
-              <a:t> 94.46%</a:t>
-            </a:r>
-          </a:p>
-          <a:p>
-            <a:pPr marL="742950" lvl="1" indent="-285750" algn="l">
-              <a:buFont typeface="Arial" panose="020B0604020202020204" pitchFamily="34" charset="0"/>
-              <a:buChar char="•"/>
-            </a:pPr>
-            <a:r>
-              <a:rPr lang="en-GB" b="1" i="0" u="none" strike="noStrike" dirty="0">
-                <a:solidFill>
-                  <a:schemeClr val="tx1"/>
-                </a:solidFill>
-                <a:effectLst/>
-                <a:latin typeface="+mj-lt"/>
-              </a:rPr>
-              <a:t>Best Validation Accuracy:</a:t>
-            </a:r>
-            <a:r>
-              <a:rPr lang="en-GB" b="0" i="0" u="none" strike="noStrike" dirty="0">
-                <a:solidFill>
-                  <a:schemeClr val="tx1"/>
-                </a:solidFill>
-                <a:effectLst/>
-                <a:latin typeface="+mj-lt"/>
-              </a:rPr>
-              <a:t> 81.26%</a:t>
-            </a:r>
-          </a:p>
-          <a:p>
-            <a:pPr marL="742950" lvl="1" indent="-285750" algn="l">
-              <a:buFont typeface="Arial" panose="020B0604020202020204" pitchFamily="34" charset="0"/>
-              <a:buChar char="•"/>
-            </a:pPr>
-            <a:r>
-              <a:rPr lang="en-GB" b="1" i="0" u="none" strike="noStrike" dirty="0">
-                <a:solidFill>
-                  <a:schemeClr val="tx1"/>
-                </a:solidFill>
-                <a:effectLst/>
-                <a:latin typeface="+mj-lt"/>
-              </a:rPr>
-              <a:t>Best Test Accuracy (using best parameters):</a:t>
-            </a:r>
-            <a:r>
-              <a:rPr lang="en-GB" b="0" i="0" u="none" strike="noStrike" dirty="0">
-                <a:solidFill>
-                  <a:schemeClr val="tx1"/>
-                </a:solidFill>
-                <a:effectLst/>
-                <a:latin typeface="+mj-lt"/>
-              </a:rPr>
-              <a:t> 82.53%</a:t>
-            </a:r>
-          </a:p>
-          <a:p>
-            <a:pPr indent="-285750">
-              <a:buFont typeface="Arial" panose="020B0604020202020204" pitchFamily="34" charset="0"/>
-              <a:buChar char="•"/>
-            </a:pPr>
-            <a:r>
-              <a:rPr lang="en-GB" b="0" i="0" u="none" strike="noStrike" dirty="0">
-                <a:solidFill>
-                  <a:schemeClr val="tx1"/>
-                </a:solidFill>
-                <a:effectLst/>
-                <a:latin typeface="+mj-lt"/>
-              </a:rPr>
-              <a:t>Random Forest ROC-AUC Score: 89.42%</a:t>
-            </a:r>
-          </a:p>
-          <a:p>
-            <a:pPr marL="742950" lvl="1" indent="-285750" algn="l">
-              <a:buFont typeface="Arial" panose="020B0604020202020204" pitchFamily="34" charset="0"/>
-              <a:buChar char="•"/>
-            </a:pPr>
-            <a:endParaRPr lang="en-GB" dirty="0">
-              <a:solidFill>
-                <a:schemeClr val="tx1"/>
-              </a:solidFill>
-              <a:latin typeface="+mj-lt"/>
-            </a:endParaRPr>
-          </a:p>
-          <a:p>
-            <a:pPr marL="457200" lvl="1" indent="0" algn="l">
-              <a:buNone/>
-            </a:pPr>
-            <a:endParaRPr lang="en-GB" b="0" i="0" u="none" strike="noStrike" dirty="0">
-              <a:solidFill>
-                <a:schemeClr val="tx1"/>
-              </a:solidFill>
-              <a:effectLst/>
-              <a:latin typeface="+mj-lt"/>
-            </a:endParaRPr>
-          </a:p>
-          <a:p>
-            <a:endParaRPr lang="en-GB" dirty="0"/>
+            <a:r>
+              <a:rPr lang="en-GB" dirty="0"/>
+              <a:t>The series of bar charts would be can to examine the impact of various factors like ethnicity, race, region, and age on treatment persistency. They show how each subgroup contributes to the overall persistency and non-persistency rates. Trends in these charts may suggest which demographics or characteristics are more likely to be associated with higher or lower treatment adherence.</a:t>
+            </a:r>
           </a:p>
         </p:txBody>
       </p:sp>
       <p:pic>
         <p:nvPicPr>
-          <p:cNvPr id="4" name="Picture 3">
+          <p:cNvPr id="7" name="Picture 6">
             <a:extLst>
               <a:ext uri="{FF2B5EF4-FFF2-40B4-BE49-F238E27FC236}">
-                <a16:creationId xmlns:a16="http://schemas.microsoft.com/office/drawing/2014/main" id="{0F5CE93F-2BA2-DDC3-B135-C426905EE0AC}"/>
+                <a16:creationId xmlns:a16="http://schemas.microsoft.com/office/drawing/2014/main" id="{9057D0B7-C2F1-5A42-0D76-F9771CBF5BEB}"/>
               </a:ext>
             </a:extLst>
           </p:cNvPr>
@@ -8755,46 +7429,15 @@
           </p:cNvPicPr>
           <p:nvPr/>
         </p:nvPicPr>
-        <p:blipFill>
+        <p:blipFill rotWithShape="1">
           <a:blip r:embed="rId2"/>
-          <a:stretch>
-            <a:fillRect/>
-          </a:stretch>
+          <a:srcRect t="40644"/>
+          <a:stretch/>
         </p:blipFill>
         <p:spPr>
           <a:xfrm>
-            <a:off x="8547944" y="289063"/>
-            <a:ext cx="3644056" cy="3139937"/>
-          </a:xfrm>
-          <a:prstGeom prst="rect">
-            <a:avLst/>
-          </a:prstGeom>
-        </p:spPr>
-      </p:pic>
-      <p:pic>
-        <p:nvPicPr>
-          <p:cNvPr id="5" name="Picture 4">
-            <a:extLst>
-              <a:ext uri="{FF2B5EF4-FFF2-40B4-BE49-F238E27FC236}">
-                <a16:creationId xmlns:a16="http://schemas.microsoft.com/office/drawing/2014/main" id="{D3613F2E-A7FC-E0CD-80BF-24E8663BFB1E}"/>
-              </a:ext>
-            </a:extLst>
-          </p:cNvPr>
-          <p:cNvPicPr>
-            <a:picLocks noChangeAspect="1"/>
-          </p:cNvPicPr>
-          <p:nvPr/>
-        </p:nvPicPr>
-        <p:blipFill>
-          <a:blip r:embed="rId3"/>
-          <a:stretch>
-            <a:fillRect/>
-          </a:stretch>
-        </p:blipFill>
-        <p:spPr>
-          <a:xfrm>
-            <a:off x="8597900" y="3571737"/>
-            <a:ext cx="3594100" cy="2882900"/>
+            <a:off x="8348870" y="114670"/>
+            <a:ext cx="3682631" cy="6628659"/>
           </a:xfrm>
           <a:prstGeom prst="rect">
             <a:avLst/>
@@ -8804,7 +7447,7 @@
     </p:spTree>
     <p:extLst>
       <p:ext uri="{BB962C8B-B14F-4D97-AF65-F5344CB8AC3E}">
-        <p14:creationId xmlns:p14="http://schemas.microsoft.com/office/powerpoint/2010/main" val="2184013454"/>
+        <p14:creationId xmlns:p14="http://schemas.microsoft.com/office/powerpoint/2010/main" val="2823928275"/>
       </p:ext>
     </p:extLst>
   </p:cSld>
@@ -8836,7 +7479,7 @@
           <p:cNvPr id="2" name="Title 1">
             <a:extLst>
               <a:ext uri="{FF2B5EF4-FFF2-40B4-BE49-F238E27FC236}">
-                <a16:creationId xmlns:a16="http://schemas.microsoft.com/office/drawing/2014/main" id="{53EE5669-8DCA-4E55-098C-86DBF3B06BAC}"/>
+                <a16:creationId xmlns:a16="http://schemas.microsoft.com/office/drawing/2014/main" id="{0871D171-96A7-D666-9DD7-0CE0023DE00C}"/>
               </a:ext>
             </a:extLst>
           </p:cNvPr>
@@ -8847,510 +7490,815 @@
             <p:ph type="title"/>
           </p:nvPr>
         </p:nvSpPr>
-        <p:spPr/>
-        <p:txBody>
-          <a:bodyPr/>
-          <a:lstStyle/>
-          <a:p>
+        <p:spPr>
+          <a:xfrm>
+            <a:off x="677334" y="530087"/>
+            <a:ext cx="6282266" cy="1320800"/>
+          </a:xfrm>
+        </p:spPr>
+        <p:txBody>
+          <a:bodyPr>
+            <a:normAutofit fontScale="90000"/>
+          </a:bodyPr>
+          <a:lstStyle/>
+          <a:p>
+            <a:r>
+              <a:rPr lang="en-GB" dirty="0"/>
+              <a:t>Statistical Association Between </a:t>
+            </a:r>
             <a:r>
               <a:rPr lang="en-GB" dirty="0" err="1"/>
-              <a:t>XGBoost</a:t>
-            </a:r>
-            <a:endParaRPr lang="en-GB" dirty="0"/>
-          </a:p>
-        </p:txBody>
-      </p:sp>
-      <p:sp>
-        <p:nvSpPr>
-          <p:cNvPr id="3" name="Content Placeholder 2">
+              <a:t>Persistency_Flag</a:t>
+            </a:r>
+            <a:r>
+              <a:rPr lang="en-GB" dirty="0"/>
+              <a:t> and Other Categorical Variables – First 10 Values Shown</a:t>
+            </a:r>
+          </a:p>
+        </p:txBody>
+      </p:sp>
+      <p:sp>
+        <p:nvSpPr>
+          <p:cNvPr id="7" name="TextBox 6">
             <a:extLst>
               <a:ext uri="{FF2B5EF4-FFF2-40B4-BE49-F238E27FC236}">
-                <a16:creationId xmlns:a16="http://schemas.microsoft.com/office/drawing/2014/main" id="{C50F971C-8FAB-0045-9FD1-79BF8A121BB9}"/>
+                <a16:creationId xmlns:a16="http://schemas.microsoft.com/office/drawing/2014/main" id="{01C1904B-CFEF-A0AF-7F26-D6C6A8D511B5}"/>
               </a:ext>
             </a:extLst>
           </p:cNvPr>
-          <p:cNvSpPr>
-            <a:spLocks noGrp="1"/>
-          </p:cNvSpPr>
-          <p:nvPr>
-            <p:ph idx="1"/>
-          </p:nvPr>
+          <p:cNvSpPr txBox="1"/>
+          <p:nvPr/>
         </p:nvSpPr>
         <p:spPr>
           <a:xfrm>
-            <a:off x="677334" y="1659835"/>
-            <a:ext cx="8784718" cy="4381527"/>
-          </a:xfrm>
-        </p:spPr>
-        <p:txBody>
-          <a:bodyPr>
-            <a:normAutofit fontScale="92500" lnSpcReduction="20000"/>
-          </a:bodyPr>
-          <a:lstStyle/>
-          <a:p>
-            <a:pPr algn="l">
-              <a:buFont typeface="Arial" panose="020B0604020202020204" pitchFamily="34" charset="0"/>
-              <a:buChar char="•"/>
-            </a:pPr>
-            <a:r>
-              <a:rPr lang="en-GB" b="1" i="0" u="none" strike="noStrike" dirty="0">
-                <a:solidFill>
-                  <a:schemeClr val="tx1"/>
-                </a:solidFill>
-                <a:effectLst/>
-                <a:latin typeface="+mj-lt"/>
-              </a:rPr>
-              <a:t>Performance Metrics in Percentages:</a:t>
-            </a:r>
-            <a:endParaRPr lang="en-GB" b="0" i="0" u="none" strike="noStrike" dirty="0">
-              <a:solidFill>
-                <a:schemeClr val="tx1"/>
-              </a:solidFill>
-              <a:effectLst/>
-              <a:latin typeface="+mj-lt"/>
-            </a:endParaRPr>
-          </a:p>
-          <a:p>
-            <a:pPr marL="742950" lvl="1" indent="-285750" algn="l">
-              <a:buFont typeface="Arial" panose="020B0604020202020204" pitchFamily="34" charset="0"/>
-              <a:buChar char="•"/>
-            </a:pPr>
-            <a:r>
-              <a:rPr lang="en-GB" b="1" i="0" u="none" strike="noStrike" dirty="0" err="1">
-                <a:solidFill>
-                  <a:schemeClr val="tx1"/>
-                </a:solidFill>
-                <a:effectLst/>
-                <a:latin typeface="+mj-lt"/>
-              </a:rPr>
-              <a:t>XGBoost</a:t>
-            </a:r>
-            <a:r>
-              <a:rPr lang="en-GB" b="1" i="0" u="none" strike="noStrike" dirty="0">
-                <a:solidFill>
-                  <a:schemeClr val="tx1"/>
-                </a:solidFill>
-                <a:effectLst/>
-                <a:latin typeface="+mj-lt"/>
-              </a:rPr>
-              <a:t> Accuracy:</a:t>
-            </a:r>
-            <a:r>
-              <a:rPr lang="en-GB" b="0" i="0" u="none" strike="noStrike" dirty="0">
-                <a:solidFill>
-                  <a:schemeClr val="tx1"/>
-                </a:solidFill>
-                <a:effectLst/>
-                <a:latin typeface="+mj-lt"/>
-              </a:rPr>
-              <a:t> 84.71%</a:t>
-            </a:r>
-          </a:p>
-          <a:p>
-            <a:pPr marL="742950" lvl="1" indent="-285750" algn="l">
-              <a:buFont typeface="Arial" panose="020B0604020202020204" pitchFamily="34" charset="0"/>
-              <a:buChar char="•"/>
-            </a:pPr>
-            <a:r>
-              <a:rPr lang="en-GB" b="1" i="0" u="none" strike="noStrike" dirty="0" err="1">
-                <a:solidFill>
-                  <a:schemeClr val="tx1"/>
-                </a:solidFill>
-                <a:effectLst/>
-                <a:latin typeface="+mj-lt"/>
-              </a:rPr>
-              <a:t>XGBoost</a:t>
-            </a:r>
-            <a:r>
-              <a:rPr lang="en-GB" b="1" i="0" u="none" strike="noStrike" dirty="0">
-                <a:solidFill>
-                  <a:schemeClr val="tx1"/>
-                </a:solidFill>
-                <a:effectLst/>
-                <a:latin typeface="+mj-lt"/>
-              </a:rPr>
-              <a:t> Precision:</a:t>
-            </a:r>
-            <a:r>
-              <a:rPr lang="en-GB" b="0" i="0" u="none" strike="noStrike" dirty="0">
-                <a:solidFill>
-                  <a:schemeClr val="tx1"/>
-                </a:solidFill>
-                <a:effectLst/>
-                <a:latin typeface="+mj-lt"/>
-              </a:rPr>
-              <a:t> 84.93%</a:t>
-            </a:r>
-          </a:p>
-          <a:p>
-            <a:pPr marL="742950" lvl="1" indent="-285750" algn="l">
-              <a:buFont typeface="Arial" panose="020B0604020202020204" pitchFamily="34" charset="0"/>
-              <a:buChar char="•"/>
-            </a:pPr>
-            <a:r>
-              <a:rPr lang="en-GB" b="1" i="0" u="none" strike="noStrike" dirty="0" err="1">
-                <a:solidFill>
-                  <a:schemeClr val="tx1"/>
-                </a:solidFill>
-                <a:effectLst/>
-                <a:latin typeface="+mj-lt"/>
-              </a:rPr>
-              <a:t>XGBoost</a:t>
-            </a:r>
-            <a:r>
-              <a:rPr lang="en-GB" b="1" i="0" u="none" strike="noStrike" dirty="0">
-                <a:solidFill>
-                  <a:schemeClr val="tx1"/>
-                </a:solidFill>
-                <a:effectLst/>
-                <a:latin typeface="+mj-lt"/>
-              </a:rPr>
-              <a:t> Recall:</a:t>
-            </a:r>
-            <a:r>
-              <a:rPr lang="en-GB" b="0" i="0" u="none" strike="noStrike" dirty="0">
-                <a:solidFill>
-                  <a:schemeClr val="tx1"/>
-                </a:solidFill>
-                <a:effectLst/>
-                <a:latin typeface="+mj-lt"/>
-              </a:rPr>
-              <a:t> 74.10%</a:t>
-            </a:r>
-          </a:p>
-          <a:p>
-            <a:pPr marL="742950" lvl="1" indent="-285750" algn="l">
-              <a:buFont typeface="Arial" panose="020B0604020202020204" pitchFamily="34" charset="0"/>
-              <a:buChar char="•"/>
-            </a:pPr>
-            <a:r>
-              <a:rPr lang="en-GB" b="1" i="0" u="none" strike="noStrike" dirty="0" err="1">
-                <a:solidFill>
-                  <a:schemeClr val="tx1"/>
-                </a:solidFill>
-                <a:effectLst/>
-                <a:latin typeface="+mj-lt"/>
-              </a:rPr>
-              <a:t>XGBoost</a:t>
-            </a:r>
-            <a:r>
-              <a:rPr lang="en-GB" b="1" i="0" u="none" strike="noStrike" dirty="0">
-                <a:solidFill>
-                  <a:schemeClr val="tx1"/>
-                </a:solidFill>
-                <a:effectLst/>
-                <a:latin typeface="+mj-lt"/>
-              </a:rPr>
-              <a:t> F1 Score:</a:t>
-            </a:r>
-            <a:r>
-              <a:rPr lang="en-GB" b="0" i="0" u="none" strike="noStrike" dirty="0">
-                <a:solidFill>
-                  <a:schemeClr val="tx1"/>
-                </a:solidFill>
-                <a:effectLst/>
-                <a:latin typeface="+mj-lt"/>
-              </a:rPr>
-              <a:t> 79.15%</a:t>
-            </a:r>
-          </a:p>
-          <a:p>
-            <a:pPr algn="l">
-              <a:buFont typeface="Arial" panose="020B0604020202020204" pitchFamily="34" charset="0"/>
-              <a:buChar char="•"/>
-            </a:pPr>
-            <a:r>
-              <a:rPr lang="en-GB" b="1" i="0" u="none" strike="noStrike" dirty="0">
-                <a:solidFill>
-                  <a:schemeClr val="tx1"/>
-                </a:solidFill>
-                <a:effectLst/>
-                <a:latin typeface="+mj-lt"/>
-              </a:rPr>
-              <a:t>Best Hyperparameters and Accuracies:</a:t>
-            </a:r>
-            <a:endParaRPr lang="en-GB" b="0" i="0" u="none" strike="noStrike" dirty="0">
-              <a:solidFill>
-                <a:schemeClr val="tx1"/>
-              </a:solidFill>
-              <a:effectLst/>
-              <a:latin typeface="+mj-lt"/>
-            </a:endParaRPr>
-          </a:p>
-          <a:p>
-            <a:pPr marL="742950" lvl="1" indent="-285750" algn="l">
-              <a:buFont typeface="Arial" panose="020B0604020202020204" pitchFamily="34" charset="0"/>
-              <a:buChar char="•"/>
-            </a:pPr>
-            <a:r>
-              <a:rPr lang="en-GB" b="1" i="0" u="none" strike="noStrike" dirty="0">
-                <a:solidFill>
-                  <a:schemeClr val="tx1"/>
-                </a:solidFill>
-                <a:effectLst/>
-                <a:latin typeface="+mj-lt"/>
-              </a:rPr>
-              <a:t>Best Hyperparameters:</a:t>
-            </a:r>
-            <a:endParaRPr lang="en-GB" b="0" i="0" u="none" strike="noStrike" dirty="0">
-              <a:solidFill>
-                <a:schemeClr val="tx1"/>
-              </a:solidFill>
-              <a:effectLst/>
-              <a:latin typeface="+mj-lt"/>
-            </a:endParaRPr>
-          </a:p>
-          <a:p>
-            <a:pPr marL="1143000" lvl="2" indent="-228600" algn="l">
-              <a:buFont typeface="Arial" panose="020B0604020202020204" pitchFamily="34" charset="0"/>
-              <a:buChar char="•"/>
-            </a:pPr>
-            <a:r>
-              <a:rPr lang="en-GB" b="0" i="0" u="none" strike="noStrike" dirty="0">
-                <a:solidFill>
-                  <a:schemeClr val="tx1"/>
-                </a:solidFill>
-                <a:effectLst/>
-                <a:latin typeface="+mj-lt"/>
-              </a:rPr>
-              <a:t>Learning Rate: 0.1</a:t>
-            </a:r>
-          </a:p>
-          <a:p>
-            <a:pPr marL="1143000" lvl="2" indent="-228600" algn="l">
-              <a:buFont typeface="Arial" panose="020B0604020202020204" pitchFamily="34" charset="0"/>
-              <a:buChar char="•"/>
-            </a:pPr>
-            <a:r>
-              <a:rPr lang="en-GB" b="0" i="0" u="none" strike="noStrike" dirty="0">
-                <a:solidFill>
-                  <a:schemeClr val="tx1"/>
-                </a:solidFill>
-                <a:effectLst/>
-                <a:latin typeface="+mj-lt"/>
-              </a:rPr>
-              <a:t>Maximum Depth of Trees ('</a:t>
-            </a:r>
-            <a:r>
-              <a:rPr lang="en-GB" b="0" i="0" u="none" strike="noStrike" dirty="0" err="1">
-                <a:solidFill>
-                  <a:schemeClr val="tx1"/>
-                </a:solidFill>
-                <a:effectLst/>
-                <a:latin typeface="+mj-lt"/>
-              </a:rPr>
-              <a:t>max_depth</a:t>
-            </a:r>
-            <a:r>
-              <a:rPr lang="en-GB" b="0" i="0" u="none" strike="noStrike" dirty="0">
-                <a:solidFill>
-                  <a:schemeClr val="tx1"/>
-                </a:solidFill>
-                <a:effectLst/>
-                <a:latin typeface="+mj-lt"/>
-              </a:rPr>
-              <a:t>'): 3</a:t>
-            </a:r>
-          </a:p>
-          <a:p>
-            <a:pPr marL="1143000" lvl="2" indent="-228600" algn="l">
-              <a:buFont typeface="Arial" panose="020B0604020202020204" pitchFamily="34" charset="0"/>
-              <a:buChar char="•"/>
-            </a:pPr>
-            <a:r>
-              <a:rPr lang="en-GB" b="0" i="0" u="none" strike="noStrike" dirty="0">
-                <a:solidFill>
-                  <a:schemeClr val="tx1"/>
-                </a:solidFill>
-                <a:effectLst/>
-                <a:latin typeface="+mj-lt"/>
-              </a:rPr>
-              <a:t>Number of Trees ('</a:t>
-            </a:r>
-            <a:r>
-              <a:rPr lang="en-GB" b="0" i="0" u="none" strike="noStrike" dirty="0" err="1">
-                <a:solidFill>
-                  <a:schemeClr val="tx1"/>
-                </a:solidFill>
-                <a:effectLst/>
-                <a:latin typeface="+mj-lt"/>
-              </a:rPr>
-              <a:t>n_estimators</a:t>
-            </a:r>
-            <a:r>
-              <a:rPr lang="en-GB" b="0" i="0" u="none" strike="noStrike" dirty="0">
-                <a:solidFill>
-                  <a:schemeClr val="tx1"/>
-                </a:solidFill>
-                <a:effectLst/>
-                <a:latin typeface="+mj-lt"/>
-              </a:rPr>
-              <a:t>'): 100</a:t>
-            </a:r>
-          </a:p>
-          <a:p>
-            <a:pPr marL="742950" lvl="1" indent="-285750" algn="l">
-              <a:buFont typeface="Arial" panose="020B0604020202020204" pitchFamily="34" charset="0"/>
-              <a:buChar char="•"/>
-            </a:pPr>
-            <a:r>
-              <a:rPr lang="en-GB" b="1" i="0" u="none" strike="noStrike" dirty="0">
-                <a:solidFill>
-                  <a:schemeClr val="tx1"/>
-                </a:solidFill>
-                <a:effectLst/>
-                <a:latin typeface="+mj-lt"/>
-              </a:rPr>
-              <a:t>Best Training Accuracy:</a:t>
-            </a:r>
-            <a:r>
-              <a:rPr lang="en-GB" b="0" i="0" u="none" strike="noStrike" dirty="0">
-                <a:solidFill>
-                  <a:schemeClr val="tx1"/>
-                </a:solidFill>
-                <a:effectLst/>
-                <a:latin typeface="+mj-lt"/>
-              </a:rPr>
-              <a:t> 86.70%</a:t>
-            </a:r>
-          </a:p>
-          <a:p>
-            <a:pPr marL="742950" lvl="1" indent="-285750" algn="l">
-              <a:buFont typeface="Arial" panose="020B0604020202020204" pitchFamily="34" charset="0"/>
-              <a:buChar char="•"/>
-            </a:pPr>
-            <a:r>
-              <a:rPr lang="en-GB" b="1" i="0" u="none" strike="noStrike" dirty="0">
-                <a:solidFill>
-                  <a:schemeClr val="tx1"/>
-                </a:solidFill>
-                <a:effectLst/>
-                <a:latin typeface="+mj-lt"/>
-              </a:rPr>
-              <a:t>Best Validation Accuracy:</a:t>
-            </a:r>
-            <a:r>
-              <a:rPr lang="en-GB" b="0" i="0" u="none" strike="noStrike" dirty="0">
-                <a:solidFill>
-                  <a:schemeClr val="tx1"/>
-                </a:solidFill>
-                <a:effectLst/>
-                <a:latin typeface="+mj-lt"/>
-              </a:rPr>
-              <a:t> 81.18%</a:t>
-            </a:r>
-          </a:p>
-          <a:p>
-            <a:pPr marL="742950" lvl="1" indent="-285750" algn="l">
-              <a:buFont typeface="Arial" panose="020B0604020202020204" pitchFamily="34" charset="0"/>
-              <a:buChar char="•"/>
-            </a:pPr>
-            <a:r>
-              <a:rPr lang="en-GB" b="1" i="0" u="none" strike="noStrike" dirty="0">
-                <a:solidFill>
-                  <a:schemeClr val="tx1"/>
-                </a:solidFill>
-                <a:effectLst/>
-                <a:latin typeface="+mj-lt"/>
-              </a:rPr>
-              <a:t>Best Test Accuracy (using best parameters):</a:t>
-            </a:r>
-            <a:r>
-              <a:rPr lang="en-GB" b="0" i="0" u="none" strike="noStrike" dirty="0">
-                <a:solidFill>
-                  <a:schemeClr val="tx1"/>
-                </a:solidFill>
-                <a:effectLst/>
-                <a:latin typeface="+mj-lt"/>
-              </a:rPr>
-              <a:t> 84.71%</a:t>
-            </a:r>
-          </a:p>
-          <a:p>
-            <a:pPr indent="-285750">
-              <a:buFont typeface="Arial" panose="020B0604020202020204" pitchFamily="34" charset="0"/>
-              <a:buChar char="•"/>
-            </a:pPr>
-            <a:r>
-              <a:rPr lang="en-GB" b="0" i="0" u="none" strike="noStrike" dirty="0">
-                <a:solidFill>
-                  <a:schemeClr val="tx1"/>
-                </a:solidFill>
-                <a:effectLst/>
-                <a:latin typeface="+mj-lt"/>
-              </a:rPr>
-              <a:t>Random Forest ROC-AUC Score: 90.6%</a:t>
-            </a:r>
-          </a:p>
-          <a:p>
-            <a:endParaRPr lang="en-GB" dirty="0"/>
-          </a:p>
-        </p:txBody>
-      </p:sp>
-      <p:pic>
-        <p:nvPicPr>
-          <p:cNvPr id="5" name="Picture 4">
-            <a:extLst>
-              <a:ext uri="{FF2B5EF4-FFF2-40B4-BE49-F238E27FC236}">
-                <a16:creationId xmlns:a16="http://schemas.microsoft.com/office/drawing/2014/main" id="{AD0E22E8-C242-8D1B-36DF-BC70C1D06882}"/>
-              </a:ext>
-            </a:extLst>
-          </p:cNvPr>
-          <p:cNvPicPr>
-            <a:picLocks noChangeAspect="1"/>
-          </p:cNvPicPr>
-          <p:nvPr/>
-        </p:nvPicPr>
-        <p:blipFill>
-          <a:blip r:embed="rId2"/>
-          <a:stretch>
-            <a:fillRect/>
-          </a:stretch>
-        </p:blipFill>
-        <p:spPr>
-          <a:xfrm>
-            <a:off x="8597900" y="360519"/>
-            <a:ext cx="3594100" cy="3068481"/>
+            <a:off x="677334" y="2553793"/>
+            <a:ext cx="6102626" cy="1200329"/>
           </a:xfrm>
           <a:prstGeom prst="rect">
             <a:avLst/>
           </a:prstGeom>
+          <a:noFill/>
         </p:spPr>
-      </p:pic>
-      <p:pic>
-        <p:nvPicPr>
-          <p:cNvPr id="6" name="Picture 5">
+        <p:txBody>
+          <a:bodyPr wrap="square">
+            <a:spAutoFit/>
+          </a:bodyPr>
+          <a:lstStyle/>
+          <a:p>
+            <a:r>
+              <a:rPr lang="en-GB" dirty="0"/>
+              <a:t>This table presents the results of the Chi-squared tests for independence, </a:t>
+            </a:r>
+            <a:r>
+              <a:rPr lang="en-GB" dirty="0" err="1"/>
+              <a:t>analyzing</a:t>
+            </a:r>
+            <a:r>
+              <a:rPr lang="en-GB" dirty="0"/>
+              <a:t> the association between various categorical variables and the </a:t>
+            </a:r>
+            <a:r>
+              <a:rPr lang="en-GB" dirty="0" err="1"/>
+              <a:t>Persistency_Flag</a:t>
+            </a:r>
+            <a:r>
+              <a:rPr lang="en-GB" dirty="0"/>
+              <a:t> feature.</a:t>
+            </a:r>
+          </a:p>
+        </p:txBody>
+      </p:sp>
+      <p:sp>
+        <p:nvSpPr>
+          <p:cNvPr id="9" name="TextBox 8">
             <a:extLst>
               <a:ext uri="{FF2B5EF4-FFF2-40B4-BE49-F238E27FC236}">
-                <a16:creationId xmlns:a16="http://schemas.microsoft.com/office/drawing/2014/main" id="{3A0F8F90-1AC8-C6A2-5D35-14E363569AC3}"/>
+                <a16:creationId xmlns:a16="http://schemas.microsoft.com/office/drawing/2014/main" id="{440D0338-BEB9-08AD-DECD-4B8B260114A0}"/>
               </a:ext>
             </a:extLst>
           </p:cNvPr>
-          <p:cNvPicPr>
-            <a:picLocks noChangeAspect="1"/>
-          </p:cNvPicPr>
+          <p:cNvSpPr txBox="1"/>
           <p:nvPr/>
-        </p:nvPicPr>
-        <p:blipFill>
-          <a:blip r:embed="rId3"/>
-          <a:stretch>
-            <a:fillRect/>
-          </a:stretch>
-        </p:blipFill>
+        </p:nvSpPr>
         <p:spPr>
           <a:xfrm>
-            <a:off x="8597900" y="3429000"/>
-            <a:ext cx="3594100" cy="2882900"/>
+            <a:off x="677334" y="3754122"/>
+            <a:ext cx="6102626" cy="2862322"/>
           </a:xfrm>
           <a:prstGeom prst="rect">
             <a:avLst/>
           </a:prstGeom>
+          <a:noFill/>
         </p:spPr>
-      </p:pic>
+        <p:txBody>
+          <a:bodyPr wrap="square">
+            <a:spAutoFit/>
+          </a:bodyPr>
+          <a:lstStyle/>
+          <a:p>
+            <a:r>
+              <a:rPr lang="en-GB" dirty="0"/>
+              <a:t>The analysis considered a p-value threshold of ≤0.05 to denote statistical significance. All listed variables meet this criterion, which suggests that they have a statistically significant association with treatment persistency.</a:t>
+            </a:r>
+          </a:p>
+          <a:p>
+            <a:r>
+              <a:rPr lang="en-GB" dirty="0"/>
+              <a:t>The variables are sorted in ascending order of their p-values, with the lowest values at the top. This order prioritizes the variables according to the strength of their association, with the strongest predictors appearing first.</a:t>
+            </a:r>
+          </a:p>
+        </p:txBody>
+      </p:sp>
+      <p:graphicFrame>
+        <p:nvGraphicFramePr>
+          <p:cNvPr id="12" name="Table 11">
+            <a:extLst>
+              <a:ext uri="{FF2B5EF4-FFF2-40B4-BE49-F238E27FC236}">
+                <a16:creationId xmlns:a16="http://schemas.microsoft.com/office/drawing/2014/main" id="{3D36EE76-3E08-565A-C3FB-DB6D50AD11BA}"/>
+              </a:ext>
+            </a:extLst>
+          </p:cNvPr>
+          <p:cNvGraphicFramePr>
+            <a:graphicFrameLocks noGrp="1"/>
+          </p:cNvGraphicFramePr>
+          <p:nvPr>
+            <p:extLst>
+              <p:ext uri="{D42A27DB-BD31-4B8C-83A1-F6EECF244321}">
+                <p14:modId xmlns:p14="http://schemas.microsoft.com/office/powerpoint/2010/main" val="1292264070"/>
+              </p:ext>
+            </p:extLst>
+          </p:nvPr>
+        </p:nvGraphicFramePr>
+        <p:xfrm>
+          <a:off x="7309455" y="607550"/>
+          <a:ext cx="4603146" cy="5505744"/>
+        </p:xfrm>
+        <a:graphic>
+          <a:graphicData uri="http://schemas.openxmlformats.org/drawingml/2006/table">
+            <a:tbl>
+              <a:tblPr>
+                <a:tableStyleId>{5940675A-B579-460E-94D1-54222C63F5DA}</a:tableStyleId>
+              </a:tblPr>
+              <a:tblGrid>
+                <a:gridCol w="2301573">
+                  <a:extLst>
+                    <a:ext uri="{9D8B030D-6E8A-4147-A177-3AD203B41FA5}">
+                      <a16:colId xmlns:a16="http://schemas.microsoft.com/office/drawing/2014/main" val="3392460736"/>
+                    </a:ext>
+                  </a:extLst>
+                </a:gridCol>
+                <a:gridCol w="2301573">
+                  <a:extLst>
+                    <a:ext uri="{9D8B030D-6E8A-4147-A177-3AD203B41FA5}">
+                      <a16:colId xmlns:a16="http://schemas.microsoft.com/office/drawing/2014/main" val="2020238225"/>
+                    </a:ext>
+                  </a:extLst>
+                </a:gridCol>
+              </a:tblGrid>
+              <a:tr h="220406">
+                <a:tc>
+                  <a:txBody>
+                    <a:bodyPr/>
+                    <a:lstStyle/>
+                    <a:p>
+                      <a:r>
+                        <a:rPr lang="en-GB" sz="1400">
+                          <a:effectLst/>
+                        </a:rPr>
+                        <a:t>Comparison against Persistency_Flag</a:t>
+                      </a:r>
+                      <a:endParaRPr lang="en-GB" sz="1400">
+                        <a:effectLst/>
+                        <a:latin typeface="Helvetica Neue" panose="02000503000000020004" pitchFamily="2" charset="0"/>
+                      </a:endParaRPr>
+                    </a:p>
+                  </a:txBody>
+                  <a:tcPr marL="35780" marR="35780" marT="7156" marB="7156">
+                    <a:solidFill>
+                      <a:schemeClr val="bg1"/>
+                    </a:solidFill>
+                  </a:tcPr>
+                </a:tc>
+                <a:tc>
+                  <a:txBody>
+                    <a:bodyPr/>
+                    <a:lstStyle/>
+                    <a:p>
+                      <a:r>
+                        <a:rPr lang="en-GB" sz="1400">
+                          <a:effectLst/>
+                        </a:rPr>
+                        <a:t>P_Value</a:t>
+                      </a:r>
+                      <a:endParaRPr lang="en-GB" sz="1400">
+                        <a:effectLst/>
+                        <a:latin typeface="Helvetica Neue" panose="02000503000000020004" pitchFamily="2" charset="0"/>
+                      </a:endParaRPr>
+                    </a:p>
+                  </a:txBody>
+                  <a:tcPr marL="35780" marR="35780" marT="7156" marB="7156">
+                    <a:solidFill>
+                      <a:schemeClr val="bg1"/>
+                    </a:solidFill>
+                  </a:tcPr>
+                </a:tc>
+                <a:extLst>
+                  <a:ext uri="{0D108BD9-81ED-4DB2-BD59-A6C34878D82A}">
+                    <a16:rowId xmlns:a16="http://schemas.microsoft.com/office/drawing/2014/main" val="1926244194"/>
+                  </a:ext>
+                </a:extLst>
+              </a:tr>
+              <a:tr h="220406">
+                <a:tc>
+                  <a:txBody>
+                    <a:bodyPr/>
+                    <a:lstStyle/>
+                    <a:p>
+                      <a:r>
+                        <a:rPr lang="en-GB" sz="1400" dirty="0" err="1">
+                          <a:effectLst/>
+                        </a:rPr>
+                        <a:t>Persistency_Flag</a:t>
+                      </a:r>
+                      <a:endParaRPr lang="en-GB" sz="1400" dirty="0">
+                        <a:effectLst/>
+                        <a:latin typeface="Helvetica Neue" panose="02000503000000020004" pitchFamily="2" charset="0"/>
+                      </a:endParaRPr>
+                    </a:p>
+                  </a:txBody>
+                  <a:tcPr marL="35780" marR="35780" marT="7156" marB="7156">
+                    <a:solidFill>
+                      <a:schemeClr val="bg1"/>
+                    </a:solidFill>
+                  </a:tcPr>
+                </a:tc>
+                <a:tc>
+                  <a:txBody>
+                    <a:bodyPr/>
+                    <a:lstStyle/>
+                    <a:p>
+                      <a:r>
+                        <a:rPr lang="en-GB" sz="1400" dirty="0">
+                          <a:effectLst/>
+                        </a:rPr>
+                        <a:t>0.000000e+00</a:t>
+                      </a:r>
+                      <a:endParaRPr lang="en-GB" sz="1400" dirty="0">
+                        <a:effectLst/>
+                        <a:latin typeface="Helvetica Neue" panose="02000503000000020004" pitchFamily="2" charset="0"/>
+                      </a:endParaRPr>
+                    </a:p>
+                  </a:txBody>
+                  <a:tcPr marL="35780" marR="35780" marT="7156" marB="7156">
+                    <a:solidFill>
+                      <a:schemeClr val="bg1"/>
+                    </a:solidFill>
+                  </a:tcPr>
+                </a:tc>
+                <a:extLst>
+                  <a:ext uri="{0D108BD9-81ED-4DB2-BD59-A6C34878D82A}">
+                    <a16:rowId xmlns:a16="http://schemas.microsoft.com/office/drawing/2014/main" val="2118625177"/>
+                  </a:ext>
+                </a:extLst>
+              </a:tr>
+              <a:tr h="220406">
+                <a:tc>
+                  <a:txBody>
+                    <a:bodyPr/>
+                    <a:lstStyle/>
+                    <a:p>
+                      <a:r>
+                        <a:rPr lang="en-GB" sz="1400">
+                          <a:effectLst/>
+                        </a:rPr>
+                        <a:t>Dexa_During_Rx</a:t>
+                      </a:r>
+                      <a:endParaRPr lang="en-GB" sz="1400">
+                        <a:effectLst/>
+                        <a:latin typeface="Helvetica Neue" panose="02000503000000020004" pitchFamily="2" charset="0"/>
+                      </a:endParaRPr>
+                    </a:p>
+                  </a:txBody>
+                  <a:tcPr marL="35780" marR="35780" marT="7156" marB="7156">
+                    <a:solidFill>
+                      <a:schemeClr val="bg1"/>
+                    </a:solidFill>
+                  </a:tcPr>
+                </a:tc>
+                <a:tc>
+                  <a:txBody>
+                    <a:bodyPr/>
+                    <a:lstStyle/>
+                    <a:p>
+                      <a:r>
+                        <a:rPr lang="en-GB" sz="1400">
+                          <a:effectLst/>
+                        </a:rPr>
+                        <a:t>1.130748e-172</a:t>
+                      </a:r>
+                      <a:endParaRPr lang="en-GB" sz="1400">
+                        <a:effectLst/>
+                        <a:latin typeface="Helvetica Neue" panose="02000503000000020004" pitchFamily="2" charset="0"/>
+                      </a:endParaRPr>
+                    </a:p>
+                  </a:txBody>
+                  <a:tcPr marL="35780" marR="35780" marT="7156" marB="7156">
+                    <a:solidFill>
+                      <a:schemeClr val="bg1"/>
+                    </a:solidFill>
+                  </a:tcPr>
+                </a:tc>
+                <a:extLst>
+                  <a:ext uri="{0D108BD9-81ED-4DB2-BD59-A6C34878D82A}">
+                    <a16:rowId xmlns:a16="http://schemas.microsoft.com/office/drawing/2014/main" val="1074538718"/>
+                  </a:ext>
+                </a:extLst>
+              </a:tr>
+              <a:tr h="426500">
+                <a:tc>
+                  <a:txBody>
+                    <a:bodyPr/>
+                    <a:lstStyle/>
+                    <a:p>
+                      <a:r>
+                        <a:rPr lang="en-GB" sz="1400">
+                          <a:effectLst/>
+                        </a:rPr>
+                        <a:t>Comorb_Long_Term_Current_Drug_Therapy</a:t>
+                      </a:r>
+                      <a:endParaRPr lang="en-GB" sz="1400">
+                        <a:effectLst/>
+                        <a:latin typeface="Helvetica Neue" panose="02000503000000020004" pitchFamily="2" charset="0"/>
+                      </a:endParaRPr>
+                    </a:p>
+                  </a:txBody>
+                  <a:tcPr marL="35780" marR="35780" marT="7156" marB="7156">
+                    <a:solidFill>
+                      <a:schemeClr val="bg1"/>
+                    </a:solidFill>
+                  </a:tcPr>
+                </a:tc>
+                <a:tc>
+                  <a:txBody>
+                    <a:bodyPr/>
+                    <a:lstStyle/>
+                    <a:p>
+                      <a:r>
+                        <a:rPr lang="en-GB" sz="1400">
+                          <a:effectLst/>
+                        </a:rPr>
+                        <a:t>7.012163e-91</a:t>
+                      </a:r>
+                      <a:endParaRPr lang="en-GB" sz="1400">
+                        <a:effectLst/>
+                        <a:latin typeface="Helvetica Neue" panose="02000503000000020004" pitchFamily="2" charset="0"/>
+                      </a:endParaRPr>
+                    </a:p>
+                  </a:txBody>
+                  <a:tcPr marL="35780" marR="35780" marT="7156" marB="7156">
+                    <a:solidFill>
+                      <a:schemeClr val="bg1"/>
+                    </a:solidFill>
+                  </a:tcPr>
+                </a:tc>
+                <a:extLst>
+                  <a:ext uri="{0D108BD9-81ED-4DB2-BD59-A6C34878D82A}">
+                    <a16:rowId xmlns:a16="http://schemas.microsoft.com/office/drawing/2014/main" val="4149903182"/>
+                  </a:ext>
+                </a:extLst>
+              </a:tr>
+              <a:tr h="220406">
+                <a:tc>
+                  <a:txBody>
+                    <a:bodyPr/>
+                    <a:lstStyle/>
+                    <a:p>
+                      <a:r>
+                        <a:rPr lang="en-GB" sz="1400">
+                          <a:effectLst/>
+                        </a:rPr>
+                        <a:t>Comorb_Encounter_For_Immunization</a:t>
+                      </a:r>
+                      <a:endParaRPr lang="en-GB" sz="1400">
+                        <a:effectLst/>
+                        <a:latin typeface="Helvetica Neue" panose="02000503000000020004" pitchFamily="2" charset="0"/>
+                      </a:endParaRPr>
+                    </a:p>
+                  </a:txBody>
+                  <a:tcPr marL="35780" marR="35780" marT="7156" marB="7156">
+                    <a:solidFill>
+                      <a:schemeClr val="bg1"/>
+                    </a:solidFill>
+                  </a:tcPr>
+                </a:tc>
+                <a:tc>
+                  <a:txBody>
+                    <a:bodyPr/>
+                    <a:lstStyle/>
+                    <a:p>
+                      <a:r>
+                        <a:rPr lang="en-GB" sz="1400">
+                          <a:effectLst/>
+                        </a:rPr>
+                        <a:t>2.250979e-72</a:t>
+                      </a:r>
+                      <a:endParaRPr lang="en-GB" sz="1400">
+                        <a:effectLst/>
+                        <a:latin typeface="Helvetica Neue" panose="02000503000000020004" pitchFamily="2" charset="0"/>
+                      </a:endParaRPr>
+                    </a:p>
+                  </a:txBody>
+                  <a:tcPr marL="35780" marR="35780" marT="7156" marB="7156">
+                    <a:solidFill>
+                      <a:schemeClr val="bg1"/>
+                    </a:solidFill>
+                  </a:tcPr>
+                </a:tc>
+                <a:extLst>
+                  <a:ext uri="{0D108BD9-81ED-4DB2-BD59-A6C34878D82A}">
+                    <a16:rowId xmlns:a16="http://schemas.microsoft.com/office/drawing/2014/main" val="839818210"/>
+                  </a:ext>
+                </a:extLst>
+              </a:tr>
+              <a:tr h="426500">
+                <a:tc>
+                  <a:txBody>
+                    <a:bodyPr/>
+                    <a:lstStyle/>
+                    <a:p>
+                      <a:r>
+                        <a:rPr lang="en-GB" sz="1400">
+                          <a:effectLst/>
+                        </a:rPr>
+                        <a:t>Comorb_Encounter_For_Screening_For_Malignant_Neoplasms</a:t>
+                      </a:r>
+                      <a:endParaRPr lang="en-GB" sz="1400">
+                        <a:effectLst/>
+                        <a:latin typeface="Helvetica Neue" panose="02000503000000020004" pitchFamily="2" charset="0"/>
+                      </a:endParaRPr>
+                    </a:p>
+                  </a:txBody>
+                  <a:tcPr marL="35780" marR="35780" marT="7156" marB="7156">
+                    <a:solidFill>
+                      <a:schemeClr val="bg1"/>
+                    </a:solidFill>
+                  </a:tcPr>
+                </a:tc>
+                <a:tc>
+                  <a:txBody>
+                    <a:bodyPr/>
+                    <a:lstStyle/>
+                    <a:p>
+                      <a:r>
+                        <a:rPr lang="en-GB" sz="1400">
+                          <a:effectLst/>
+                        </a:rPr>
+                        <a:t>6.952994e-72</a:t>
+                      </a:r>
+                      <a:endParaRPr lang="en-GB" sz="1400">
+                        <a:effectLst/>
+                        <a:latin typeface="Helvetica Neue" panose="02000503000000020004" pitchFamily="2" charset="0"/>
+                      </a:endParaRPr>
+                    </a:p>
+                  </a:txBody>
+                  <a:tcPr marL="35780" marR="35780" marT="7156" marB="7156">
+                    <a:solidFill>
+                      <a:schemeClr val="bg1"/>
+                    </a:solidFill>
+                  </a:tcPr>
+                </a:tc>
+                <a:extLst>
+                  <a:ext uri="{0D108BD9-81ED-4DB2-BD59-A6C34878D82A}">
+                    <a16:rowId xmlns:a16="http://schemas.microsoft.com/office/drawing/2014/main" val="1879689107"/>
+                  </a:ext>
+                </a:extLst>
+              </a:tr>
+              <a:tr h="426500">
+                <a:tc>
+                  <a:txBody>
+                    <a:bodyPr/>
+                    <a:lstStyle/>
+                    <a:p>
+                      <a:r>
+                        <a:rPr lang="en-GB" sz="1400">
+                          <a:effectLst/>
+                        </a:rPr>
+                        <a:t>Comorb_Encntr_For_General_Exam_W_O_Complaint,_Susp_Or_Reprtd_Dx</a:t>
+                      </a:r>
+                      <a:endParaRPr lang="en-GB" sz="1400">
+                        <a:effectLst/>
+                        <a:latin typeface="Helvetica Neue" panose="02000503000000020004" pitchFamily="2" charset="0"/>
+                      </a:endParaRPr>
+                    </a:p>
+                  </a:txBody>
+                  <a:tcPr marL="35780" marR="35780" marT="7156" marB="7156">
+                    <a:solidFill>
+                      <a:schemeClr val="bg1"/>
+                    </a:solidFill>
+                  </a:tcPr>
+                </a:tc>
+                <a:tc>
+                  <a:txBody>
+                    <a:bodyPr/>
+                    <a:lstStyle/>
+                    <a:p>
+                      <a:r>
+                        <a:rPr lang="en-GB" sz="1400">
+                          <a:effectLst/>
+                        </a:rPr>
+                        <a:t>2.779927e-59</a:t>
+                      </a:r>
+                      <a:endParaRPr lang="en-GB" sz="1400">
+                        <a:effectLst/>
+                        <a:latin typeface="Helvetica Neue" panose="02000503000000020004" pitchFamily="2" charset="0"/>
+                      </a:endParaRPr>
+                    </a:p>
+                  </a:txBody>
+                  <a:tcPr marL="35780" marR="35780" marT="7156" marB="7156">
+                    <a:solidFill>
+                      <a:schemeClr val="bg1"/>
+                    </a:solidFill>
+                  </a:tcPr>
+                </a:tc>
+                <a:extLst>
+                  <a:ext uri="{0D108BD9-81ED-4DB2-BD59-A6C34878D82A}">
+                    <a16:rowId xmlns:a16="http://schemas.microsoft.com/office/drawing/2014/main" val="673126926"/>
+                  </a:ext>
+                </a:extLst>
+              </a:tr>
+              <a:tr h="426500">
+                <a:tc>
+                  <a:txBody>
+                    <a:bodyPr/>
+                    <a:lstStyle/>
+                    <a:p>
+                      <a:r>
+                        <a:rPr lang="en-GB" sz="1400">
+                          <a:effectLst/>
+                        </a:rPr>
+                        <a:t>Comorb_Other_Disorders_Of_Bone_Density_And_Structure</a:t>
+                      </a:r>
+                      <a:endParaRPr lang="en-GB" sz="1400">
+                        <a:effectLst/>
+                        <a:latin typeface="Helvetica Neue" panose="02000503000000020004" pitchFamily="2" charset="0"/>
+                      </a:endParaRPr>
+                    </a:p>
+                  </a:txBody>
+                  <a:tcPr marL="35780" marR="35780" marT="7156" marB="7156">
+                    <a:solidFill>
+                      <a:schemeClr val="bg1"/>
+                    </a:solidFill>
+                  </a:tcPr>
+                </a:tc>
+                <a:tc>
+                  <a:txBody>
+                    <a:bodyPr/>
+                    <a:lstStyle/>
+                    <a:p>
+                      <a:r>
+                        <a:rPr lang="en-GB" sz="1400">
+                          <a:effectLst/>
+                        </a:rPr>
+                        <a:t>5.088962e-46</a:t>
+                      </a:r>
+                      <a:endParaRPr lang="en-GB" sz="1400">
+                        <a:effectLst/>
+                        <a:latin typeface="Helvetica Neue" panose="02000503000000020004" pitchFamily="2" charset="0"/>
+                      </a:endParaRPr>
+                    </a:p>
+                  </a:txBody>
+                  <a:tcPr marL="35780" marR="35780" marT="7156" marB="7156">
+                    <a:solidFill>
+                      <a:schemeClr val="bg1"/>
+                    </a:solidFill>
+                  </a:tcPr>
+                </a:tc>
+                <a:extLst>
+                  <a:ext uri="{0D108BD9-81ED-4DB2-BD59-A6C34878D82A}">
+                    <a16:rowId xmlns:a16="http://schemas.microsoft.com/office/drawing/2014/main" val="2818262002"/>
+                  </a:ext>
+                </a:extLst>
+              </a:tr>
+              <a:tr h="426500">
+                <a:tc>
+                  <a:txBody>
+                    <a:bodyPr/>
+                    <a:lstStyle/>
+                    <a:p>
+                      <a:r>
+                        <a:rPr lang="en-GB" sz="1400">
+                          <a:effectLst/>
+                        </a:rPr>
+                        <a:t>Concom_Systemic_Corticosteroids_Plain</a:t>
+                      </a:r>
+                      <a:endParaRPr lang="en-GB" sz="1400">
+                        <a:effectLst/>
+                        <a:latin typeface="Helvetica Neue" panose="02000503000000020004" pitchFamily="2" charset="0"/>
+                      </a:endParaRPr>
+                    </a:p>
+                  </a:txBody>
+                  <a:tcPr marL="35780" marR="35780" marT="7156" marB="7156">
+                    <a:solidFill>
+                      <a:schemeClr val="bg1"/>
+                    </a:solidFill>
+                  </a:tcPr>
+                </a:tc>
+                <a:tc>
+                  <a:txBody>
+                    <a:bodyPr/>
+                    <a:lstStyle/>
+                    <a:p>
+                      <a:r>
+                        <a:rPr lang="en-GB" sz="1400">
+                          <a:effectLst/>
+                        </a:rPr>
+                        <a:t>3.034717e-43</a:t>
+                      </a:r>
+                      <a:endParaRPr lang="en-GB" sz="1400">
+                        <a:effectLst/>
+                        <a:latin typeface="Helvetica Neue" panose="02000503000000020004" pitchFamily="2" charset="0"/>
+                      </a:endParaRPr>
+                    </a:p>
+                  </a:txBody>
+                  <a:tcPr marL="35780" marR="35780" marT="7156" marB="7156">
+                    <a:solidFill>
+                      <a:schemeClr val="bg1"/>
+                    </a:solidFill>
+                  </a:tcPr>
+                </a:tc>
+                <a:extLst>
+                  <a:ext uri="{0D108BD9-81ED-4DB2-BD59-A6C34878D82A}">
+                    <a16:rowId xmlns:a16="http://schemas.microsoft.com/office/drawing/2014/main" val="2083603640"/>
+                  </a:ext>
+                </a:extLst>
+              </a:tr>
+              <a:tr h="426500">
+                <a:tc>
+                  <a:txBody>
+                    <a:bodyPr/>
+                    <a:lstStyle/>
+                    <a:p>
+                      <a:r>
+                        <a:rPr lang="en-GB" sz="1400">
+                          <a:effectLst/>
+                        </a:rPr>
+                        <a:t>Comorb_Other_Joint_Disorder_Not_Elsewhere_Classified</a:t>
+                      </a:r>
+                      <a:endParaRPr lang="en-GB" sz="1400">
+                        <a:effectLst/>
+                        <a:latin typeface="Helvetica Neue" panose="02000503000000020004" pitchFamily="2" charset="0"/>
+                      </a:endParaRPr>
+                    </a:p>
+                  </a:txBody>
+                  <a:tcPr marL="35780" marR="35780" marT="7156" marB="7156">
+                    <a:solidFill>
+                      <a:schemeClr val="bg1"/>
+                    </a:solidFill>
+                  </a:tcPr>
+                </a:tc>
+                <a:tc>
+                  <a:txBody>
+                    <a:bodyPr/>
+                    <a:lstStyle/>
+                    <a:p>
+                      <a:r>
+                        <a:rPr lang="en-GB" sz="1400">
+                          <a:effectLst/>
+                        </a:rPr>
+                        <a:t>1.184227e-39</a:t>
+                      </a:r>
+                      <a:endParaRPr lang="en-GB" sz="1400">
+                        <a:effectLst/>
+                        <a:latin typeface="Helvetica Neue" panose="02000503000000020004" pitchFamily="2" charset="0"/>
+                      </a:endParaRPr>
+                    </a:p>
+                  </a:txBody>
+                  <a:tcPr marL="35780" marR="35780" marT="7156" marB="7156">
+                    <a:solidFill>
+                      <a:schemeClr val="bg1"/>
+                    </a:solidFill>
+                  </a:tcPr>
+                </a:tc>
+                <a:extLst>
+                  <a:ext uri="{0D108BD9-81ED-4DB2-BD59-A6C34878D82A}">
+                    <a16:rowId xmlns:a16="http://schemas.microsoft.com/office/drawing/2014/main" val="2588565662"/>
+                  </a:ext>
+                </a:extLst>
+              </a:tr>
+              <a:tr h="220406">
+                <a:tc>
+                  <a:txBody>
+                    <a:bodyPr/>
+                    <a:lstStyle/>
+                    <a:p>
+                      <a:r>
+                        <a:rPr lang="en-GB" sz="1400">
+                          <a:effectLst/>
+                        </a:rPr>
+                        <a:t>Concom_Anaesthetics_General</a:t>
+                      </a:r>
+                      <a:endParaRPr lang="en-GB" sz="1400">
+                        <a:effectLst/>
+                        <a:latin typeface="Helvetica Neue" panose="02000503000000020004" pitchFamily="2" charset="0"/>
+                      </a:endParaRPr>
+                    </a:p>
+                  </a:txBody>
+                  <a:tcPr marL="35780" marR="35780" marT="7156" marB="7156">
+                    <a:solidFill>
+                      <a:schemeClr val="bg1"/>
+                    </a:solidFill>
+                  </a:tcPr>
+                </a:tc>
+                <a:tc>
+                  <a:txBody>
+                    <a:bodyPr/>
+                    <a:lstStyle/>
+                    <a:p>
+                      <a:r>
+                        <a:rPr lang="en-GB" sz="1400">
+                          <a:effectLst/>
+                        </a:rPr>
+                        <a:t>1.346314e-37</a:t>
+                      </a:r>
+                      <a:endParaRPr lang="en-GB" sz="1400">
+                        <a:effectLst/>
+                        <a:latin typeface="Helvetica Neue" panose="02000503000000020004" pitchFamily="2" charset="0"/>
+                      </a:endParaRPr>
+                    </a:p>
+                  </a:txBody>
+                  <a:tcPr marL="35780" marR="35780" marT="7156" marB="7156">
+                    <a:solidFill>
+                      <a:schemeClr val="bg1"/>
+                    </a:solidFill>
+                  </a:tcPr>
+                </a:tc>
+                <a:extLst>
+                  <a:ext uri="{0D108BD9-81ED-4DB2-BD59-A6C34878D82A}">
+                    <a16:rowId xmlns:a16="http://schemas.microsoft.com/office/drawing/2014/main" val="4266113658"/>
+                  </a:ext>
+                </a:extLst>
+              </a:tr>
+              <a:tr h="220406">
+                <a:tc>
+                  <a:txBody>
+                    <a:bodyPr/>
+                    <a:lstStyle/>
+                    <a:p>
+                      <a:r>
+                        <a:rPr lang="en-GB" sz="1400">
+                          <a:effectLst/>
+                        </a:rPr>
+                        <a:t>...</a:t>
+                      </a:r>
+                      <a:endParaRPr lang="en-GB" sz="1400">
+                        <a:effectLst/>
+                        <a:latin typeface="Helvetica Neue" panose="02000503000000020004" pitchFamily="2" charset="0"/>
+                      </a:endParaRPr>
+                    </a:p>
+                  </a:txBody>
+                  <a:tcPr marL="35780" marR="35780" marT="7156" marB="7156">
+                    <a:solidFill>
+                      <a:schemeClr val="bg1"/>
+                    </a:solidFill>
+                  </a:tcPr>
+                </a:tc>
+                <a:tc>
+                  <a:txBody>
+                    <a:bodyPr/>
+                    <a:lstStyle/>
+                    <a:p>
+                      <a:r>
+                        <a:rPr lang="en-GB" sz="1400" dirty="0">
+                          <a:effectLst/>
+                        </a:rPr>
+                        <a:t>...</a:t>
+                      </a:r>
+                      <a:endParaRPr lang="en-GB" sz="1400" dirty="0">
+                        <a:effectLst/>
+                        <a:latin typeface="Helvetica Neue" panose="02000503000000020004" pitchFamily="2" charset="0"/>
+                      </a:endParaRPr>
+                    </a:p>
+                  </a:txBody>
+                  <a:tcPr marL="35780" marR="35780" marT="7156" marB="7156">
+                    <a:solidFill>
+                      <a:schemeClr val="bg1"/>
+                    </a:solidFill>
+                  </a:tcPr>
+                </a:tc>
+                <a:extLst>
+                  <a:ext uri="{0D108BD9-81ED-4DB2-BD59-A6C34878D82A}">
+                    <a16:rowId xmlns:a16="http://schemas.microsoft.com/office/drawing/2014/main" val="3548829294"/>
+                  </a:ext>
+                </a:extLst>
+              </a:tr>
+            </a:tbl>
+          </a:graphicData>
+        </a:graphic>
+      </p:graphicFrame>
     </p:spTree>
     <p:extLst>
       <p:ext uri="{BB962C8B-B14F-4D97-AF65-F5344CB8AC3E}">
-        <p14:creationId xmlns:p14="http://schemas.microsoft.com/office/powerpoint/2010/main" val="2879282535"/>
+        <p14:creationId xmlns:p14="http://schemas.microsoft.com/office/powerpoint/2010/main" val="4048759338"/>
       </p:ext>
     </p:extLst>
   </p:cSld>

</xml_diff>